<commit_message>
hecho cambios en power point
</commit_message>
<xml_diff>
--- a/carles/poryecto integrado.pptx
+++ b/carles/poryecto integrado.pptx
@@ -4,8 +4,18 @@
   <p:sldMasterIdLst>
     <p:sldMasterId id="2147483748" r:id="rId1"/>
   </p:sldMasterIdLst>
+  <p:notesMasterIdLst>
+    <p:notesMasterId r:id="rId10"/>
+  </p:notesMasterIdLst>
   <p:sldIdLst>
     <p:sldId id="256" r:id="rId2"/>
+    <p:sldId id="257" r:id="rId3"/>
+    <p:sldId id="262" r:id="rId4"/>
+    <p:sldId id="258" r:id="rId5"/>
+    <p:sldId id="259" r:id="rId6"/>
+    <p:sldId id="260" r:id="rId7"/>
+    <p:sldId id="261" r:id="rId8"/>
+    <p:sldId id="263" r:id="rId9"/>
   </p:sldIdLst>
   <p:sldSz cx="12192000" cy="6858000"/>
   <p:notesSz cx="6858000" cy="9144000"/>
@@ -104,7 +114,362 @@
       </a:defRPr>
     </a:lvl9pPr>
   </p:defaultTextStyle>
+  <p:extLst>
+    <p:ext uri="{EFAFB233-063F-42B5-8137-9DF3F51BA10A}">
+      <p15:sldGuideLst xmlns:p15="http://schemas.microsoft.com/office/powerpoint/2012/main"/>
+    </p:ext>
+  </p:extLst>
 </p:presentation>
+</file>
+
+<file path=ppt/notesMasters/notesMaster1.xml><?xml version="1.0" encoding="utf-8"?>
+<p:notesMaster xmlns:a="http://schemas.openxmlformats.org/drawingml/2006/main" xmlns:r="http://schemas.openxmlformats.org/officeDocument/2006/relationships" xmlns:p="http://schemas.openxmlformats.org/presentationml/2006/main">
+  <p:cSld>
+    <p:bg>
+      <p:bgRef idx="1001">
+        <a:schemeClr val="bg1"/>
+      </p:bgRef>
+    </p:bg>
+    <p:spTree>
+      <p:nvGrpSpPr>
+        <p:cNvPr id="1" name=""/>
+        <p:cNvGrpSpPr/>
+        <p:nvPr/>
+      </p:nvGrpSpPr>
+      <p:grpSpPr>
+        <a:xfrm>
+          <a:off x="0" y="0"/>
+          <a:ext cx="0" cy="0"/>
+          <a:chOff x="0" y="0"/>
+          <a:chExt cx="0" cy="0"/>
+        </a:xfrm>
+      </p:grpSpPr>
+      <p:sp>
+        <p:nvSpPr>
+          <p:cNvPr id="2" name="Marcador de encabezado 1"/>
+          <p:cNvSpPr>
+            <a:spLocks noGrp="1"/>
+          </p:cNvSpPr>
+          <p:nvPr>
+            <p:ph type="hdr" sz="quarter"/>
+          </p:nvPr>
+        </p:nvSpPr>
+        <p:spPr>
+          <a:xfrm>
+            <a:off x="0" y="0"/>
+            <a:ext cx="2971800" cy="458788"/>
+          </a:xfrm>
+          <a:prstGeom prst="rect">
+            <a:avLst/>
+          </a:prstGeom>
+        </p:spPr>
+        <p:txBody>
+          <a:bodyPr vert="horz" lIns="91440" tIns="45720" rIns="91440" bIns="45720" rtlCol="0"/>
+          <a:lstStyle>
+            <a:lvl1pPr algn="l">
+              <a:defRPr sz="1200"/>
+            </a:lvl1pPr>
+          </a:lstStyle>
+          <a:p>
+            <a:endParaRPr lang="es-ES"/>
+          </a:p>
+        </p:txBody>
+      </p:sp>
+      <p:sp>
+        <p:nvSpPr>
+          <p:cNvPr id="3" name="Marcador de fecha 2"/>
+          <p:cNvSpPr>
+            <a:spLocks noGrp="1"/>
+          </p:cNvSpPr>
+          <p:nvPr>
+            <p:ph type="dt" idx="1"/>
+          </p:nvPr>
+        </p:nvSpPr>
+        <p:spPr>
+          <a:xfrm>
+            <a:off x="3884613" y="0"/>
+            <a:ext cx="2971800" cy="458788"/>
+          </a:xfrm>
+          <a:prstGeom prst="rect">
+            <a:avLst/>
+          </a:prstGeom>
+        </p:spPr>
+        <p:txBody>
+          <a:bodyPr vert="horz" lIns="91440" tIns="45720" rIns="91440" bIns="45720" rtlCol="0"/>
+          <a:lstStyle>
+            <a:lvl1pPr algn="r">
+              <a:defRPr sz="1200"/>
+            </a:lvl1pPr>
+          </a:lstStyle>
+          <a:p>
+            <a:fld id="{8D0A0131-5657-400C-AEB8-14B10EF725CF}" type="datetimeFigureOut">
+              <a:rPr lang="es-ES" smtClean="0"/>
+              <a:t>30/03/2022</a:t>
+            </a:fld>
+            <a:endParaRPr lang="es-ES"/>
+          </a:p>
+        </p:txBody>
+      </p:sp>
+      <p:sp>
+        <p:nvSpPr>
+          <p:cNvPr id="4" name="Marcador de imagen de diapositiva 3"/>
+          <p:cNvSpPr>
+            <a:spLocks noGrp="1" noRot="1" noChangeAspect="1"/>
+          </p:cNvSpPr>
+          <p:nvPr>
+            <p:ph type="sldImg" idx="2"/>
+          </p:nvPr>
+        </p:nvSpPr>
+        <p:spPr>
+          <a:xfrm>
+            <a:off x="685800" y="1143000"/>
+            <a:ext cx="5486400" cy="3086100"/>
+          </a:xfrm>
+          <a:prstGeom prst="rect">
+            <a:avLst/>
+          </a:prstGeom>
+          <a:noFill/>
+          <a:ln w="12700">
+            <a:solidFill>
+              <a:prstClr val="black"/>
+            </a:solidFill>
+          </a:ln>
+        </p:spPr>
+        <p:txBody>
+          <a:bodyPr vert="horz" lIns="91440" tIns="45720" rIns="91440" bIns="45720" rtlCol="0" anchor="ctr"/>
+          <a:lstStyle/>
+          <a:p>
+            <a:endParaRPr lang="es-ES"/>
+          </a:p>
+        </p:txBody>
+      </p:sp>
+      <p:sp>
+        <p:nvSpPr>
+          <p:cNvPr id="5" name="Marcador de notas 4"/>
+          <p:cNvSpPr>
+            <a:spLocks noGrp="1"/>
+          </p:cNvSpPr>
+          <p:nvPr>
+            <p:ph type="body" sz="quarter" idx="3"/>
+          </p:nvPr>
+        </p:nvSpPr>
+        <p:spPr>
+          <a:xfrm>
+            <a:off x="685800" y="4400550"/>
+            <a:ext cx="5486400" cy="3600450"/>
+          </a:xfrm>
+          <a:prstGeom prst="rect">
+            <a:avLst/>
+          </a:prstGeom>
+        </p:spPr>
+        <p:txBody>
+          <a:bodyPr vert="horz" lIns="91440" tIns="45720" rIns="91440" bIns="45720" rtlCol="0"/>
+          <a:lstStyle/>
+          <a:p>
+            <a:pPr lvl="0"/>
+            <a:r>
+              <a:rPr lang="es-ES" smtClean="0"/>
+              <a:t>Editar el estilo de texto del patrón</a:t>
+            </a:r>
+          </a:p>
+          <a:p>
+            <a:pPr lvl="1"/>
+            <a:r>
+              <a:rPr lang="es-ES" smtClean="0"/>
+              <a:t>Segundo nivel</a:t>
+            </a:r>
+          </a:p>
+          <a:p>
+            <a:pPr lvl="2"/>
+            <a:r>
+              <a:rPr lang="es-ES" smtClean="0"/>
+              <a:t>Tercer nivel</a:t>
+            </a:r>
+          </a:p>
+          <a:p>
+            <a:pPr lvl="3"/>
+            <a:r>
+              <a:rPr lang="es-ES" smtClean="0"/>
+              <a:t>Cuarto nivel</a:t>
+            </a:r>
+          </a:p>
+          <a:p>
+            <a:pPr lvl="4"/>
+            <a:r>
+              <a:rPr lang="es-ES" smtClean="0"/>
+              <a:t>Quinto nivel</a:t>
+            </a:r>
+            <a:endParaRPr lang="es-ES"/>
+          </a:p>
+        </p:txBody>
+      </p:sp>
+      <p:sp>
+        <p:nvSpPr>
+          <p:cNvPr id="6" name="Marcador de pie de página 5"/>
+          <p:cNvSpPr>
+            <a:spLocks noGrp="1"/>
+          </p:cNvSpPr>
+          <p:nvPr>
+            <p:ph type="ftr" sz="quarter" idx="4"/>
+          </p:nvPr>
+        </p:nvSpPr>
+        <p:spPr>
+          <a:xfrm>
+            <a:off x="0" y="8685213"/>
+            <a:ext cx="2971800" cy="458787"/>
+          </a:xfrm>
+          <a:prstGeom prst="rect">
+            <a:avLst/>
+          </a:prstGeom>
+        </p:spPr>
+        <p:txBody>
+          <a:bodyPr vert="horz" lIns="91440" tIns="45720" rIns="91440" bIns="45720" rtlCol="0" anchor="b"/>
+          <a:lstStyle>
+            <a:lvl1pPr algn="l">
+              <a:defRPr sz="1200"/>
+            </a:lvl1pPr>
+          </a:lstStyle>
+          <a:p>
+            <a:endParaRPr lang="es-ES"/>
+          </a:p>
+        </p:txBody>
+      </p:sp>
+      <p:sp>
+        <p:nvSpPr>
+          <p:cNvPr id="7" name="Marcador de número de diapositiva 6"/>
+          <p:cNvSpPr>
+            <a:spLocks noGrp="1"/>
+          </p:cNvSpPr>
+          <p:nvPr>
+            <p:ph type="sldNum" sz="quarter" idx="5"/>
+          </p:nvPr>
+        </p:nvSpPr>
+        <p:spPr>
+          <a:xfrm>
+            <a:off x="3884613" y="8685213"/>
+            <a:ext cx="2971800" cy="458787"/>
+          </a:xfrm>
+          <a:prstGeom prst="rect">
+            <a:avLst/>
+          </a:prstGeom>
+        </p:spPr>
+        <p:txBody>
+          <a:bodyPr vert="horz" lIns="91440" tIns="45720" rIns="91440" bIns="45720" rtlCol="0" anchor="b"/>
+          <a:lstStyle>
+            <a:lvl1pPr algn="r">
+              <a:defRPr sz="1200"/>
+            </a:lvl1pPr>
+          </a:lstStyle>
+          <a:p>
+            <a:fld id="{A05374B6-C8F6-4B01-B3F9-4E28B7B2EEE4}" type="slidenum">
+              <a:rPr lang="es-ES" smtClean="0"/>
+              <a:t>‹Nº›</a:t>
+            </a:fld>
+            <a:endParaRPr lang="es-ES"/>
+          </a:p>
+        </p:txBody>
+      </p:sp>
+    </p:spTree>
+    <p:extLst>
+      <p:ext uri="{BB962C8B-B14F-4D97-AF65-F5344CB8AC3E}">
+        <p14:creationId xmlns:p14="http://schemas.microsoft.com/office/powerpoint/2010/main" val="3070793311"/>
+      </p:ext>
+    </p:extLst>
+  </p:cSld>
+  <p:clrMap bg1="lt1" tx1="dk1" bg2="lt2" tx2="dk2" accent1="accent1" accent2="accent2" accent3="accent3" accent4="accent4" accent5="accent5" accent6="accent6" hlink="hlink" folHlink="folHlink"/>
+  <p:notesStyle>
+    <a:lvl1pPr marL="0" algn="l" defTabSz="914400" rtl="0" eaLnBrk="1" latinLnBrk="0" hangingPunct="1">
+      <a:defRPr sz="1200" kern="1200">
+        <a:solidFill>
+          <a:schemeClr val="tx1"/>
+        </a:solidFill>
+        <a:latin typeface="+mn-lt"/>
+        <a:ea typeface="+mn-ea"/>
+        <a:cs typeface="+mn-cs"/>
+      </a:defRPr>
+    </a:lvl1pPr>
+    <a:lvl2pPr marL="457200" algn="l" defTabSz="914400" rtl="0" eaLnBrk="1" latinLnBrk="0" hangingPunct="1">
+      <a:defRPr sz="1200" kern="1200">
+        <a:solidFill>
+          <a:schemeClr val="tx1"/>
+        </a:solidFill>
+        <a:latin typeface="+mn-lt"/>
+        <a:ea typeface="+mn-ea"/>
+        <a:cs typeface="+mn-cs"/>
+      </a:defRPr>
+    </a:lvl2pPr>
+    <a:lvl3pPr marL="914400" algn="l" defTabSz="914400" rtl="0" eaLnBrk="1" latinLnBrk="0" hangingPunct="1">
+      <a:defRPr sz="1200" kern="1200">
+        <a:solidFill>
+          <a:schemeClr val="tx1"/>
+        </a:solidFill>
+        <a:latin typeface="+mn-lt"/>
+        <a:ea typeface="+mn-ea"/>
+        <a:cs typeface="+mn-cs"/>
+      </a:defRPr>
+    </a:lvl3pPr>
+    <a:lvl4pPr marL="1371600" algn="l" defTabSz="914400" rtl="0" eaLnBrk="1" latinLnBrk="0" hangingPunct="1">
+      <a:defRPr sz="1200" kern="1200">
+        <a:solidFill>
+          <a:schemeClr val="tx1"/>
+        </a:solidFill>
+        <a:latin typeface="+mn-lt"/>
+        <a:ea typeface="+mn-ea"/>
+        <a:cs typeface="+mn-cs"/>
+      </a:defRPr>
+    </a:lvl4pPr>
+    <a:lvl5pPr marL="1828800" algn="l" defTabSz="914400" rtl="0" eaLnBrk="1" latinLnBrk="0" hangingPunct="1">
+      <a:defRPr sz="1200" kern="1200">
+        <a:solidFill>
+          <a:schemeClr val="tx1"/>
+        </a:solidFill>
+        <a:latin typeface="+mn-lt"/>
+        <a:ea typeface="+mn-ea"/>
+        <a:cs typeface="+mn-cs"/>
+      </a:defRPr>
+    </a:lvl5pPr>
+    <a:lvl6pPr marL="2286000" algn="l" defTabSz="914400" rtl="0" eaLnBrk="1" latinLnBrk="0" hangingPunct="1">
+      <a:defRPr sz="1200" kern="1200">
+        <a:solidFill>
+          <a:schemeClr val="tx1"/>
+        </a:solidFill>
+        <a:latin typeface="+mn-lt"/>
+        <a:ea typeface="+mn-ea"/>
+        <a:cs typeface="+mn-cs"/>
+      </a:defRPr>
+    </a:lvl6pPr>
+    <a:lvl7pPr marL="2743200" algn="l" defTabSz="914400" rtl="0" eaLnBrk="1" latinLnBrk="0" hangingPunct="1">
+      <a:defRPr sz="1200" kern="1200">
+        <a:solidFill>
+          <a:schemeClr val="tx1"/>
+        </a:solidFill>
+        <a:latin typeface="+mn-lt"/>
+        <a:ea typeface="+mn-ea"/>
+        <a:cs typeface="+mn-cs"/>
+      </a:defRPr>
+    </a:lvl7pPr>
+    <a:lvl8pPr marL="3200400" algn="l" defTabSz="914400" rtl="0" eaLnBrk="1" latinLnBrk="0" hangingPunct="1">
+      <a:defRPr sz="1200" kern="1200">
+        <a:solidFill>
+          <a:schemeClr val="tx1"/>
+        </a:solidFill>
+        <a:latin typeface="+mn-lt"/>
+        <a:ea typeface="+mn-ea"/>
+        <a:cs typeface="+mn-cs"/>
+      </a:defRPr>
+    </a:lvl8pPr>
+    <a:lvl9pPr marL="3657600" algn="l" defTabSz="914400" rtl="0" eaLnBrk="1" latinLnBrk="0" hangingPunct="1">
+      <a:defRPr sz="1200" kern="1200">
+        <a:solidFill>
+          <a:schemeClr val="tx1"/>
+        </a:solidFill>
+        <a:latin typeface="+mn-lt"/>
+        <a:ea typeface="+mn-ea"/>
+        <a:cs typeface="+mn-cs"/>
+      </a:defRPr>
+    </a:lvl9pPr>
+  </p:notesStyle>
+</p:notesMaster>
 </file>
 
 <file path=ppt/slideLayouts/slideLayout1.xml><?xml version="1.0" encoding="utf-8"?>
@@ -829,7 +1194,7 @@
           <a:p>
             <a:fld id="{B6997077-FBCB-4FA1-BC7A-2BCFA2F1184B}" type="datetimeFigureOut">
               <a:rPr lang="es-ES" smtClean="0"/>
-              <a:t>29/03/2022</a:t>
+              <a:t>30/03/2022</a:t>
             </a:fld>
             <a:endParaRPr lang="es-ES"/>
           </a:p>
@@ -1080,7 +1445,7 @@
           <a:p>
             <a:fld id="{B6997077-FBCB-4FA1-BC7A-2BCFA2F1184B}" type="datetimeFigureOut">
               <a:rPr lang="es-ES" smtClean="0"/>
-              <a:t>29/03/2022</a:t>
+              <a:t>30/03/2022</a:t>
             </a:fld>
             <a:endParaRPr lang="es-ES"/>
           </a:p>
@@ -1394,7 +1759,7 @@
           <a:p>
             <a:fld id="{B6997077-FBCB-4FA1-BC7A-2BCFA2F1184B}" type="datetimeFigureOut">
               <a:rPr lang="es-ES" smtClean="0"/>
-              <a:t>29/03/2022</a:t>
+              <a:t>30/03/2022</a:t>
             </a:fld>
             <a:endParaRPr lang="es-ES"/>
           </a:p>
@@ -1735,7 +2100,7 @@
           <a:p>
             <a:fld id="{B6997077-FBCB-4FA1-BC7A-2BCFA2F1184B}" type="datetimeFigureOut">
               <a:rPr lang="es-ES" smtClean="0"/>
-              <a:t>29/03/2022</a:t>
+              <a:t>30/03/2022</a:t>
             </a:fld>
             <a:endParaRPr lang="es-ES"/>
           </a:p>
@@ -2049,7 +2414,7 @@
           <a:p>
             <a:fld id="{B6997077-FBCB-4FA1-BC7A-2BCFA2F1184B}" type="datetimeFigureOut">
               <a:rPr lang="es-ES" smtClean="0"/>
-              <a:t>29/03/2022</a:t>
+              <a:t>30/03/2022</a:t>
             </a:fld>
             <a:endParaRPr lang="es-ES"/>
           </a:p>
@@ -2442,7 +2807,7 @@
           <a:p>
             <a:fld id="{B6997077-FBCB-4FA1-BC7A-2BCFA2F1184B}" type="datetimeFigureOut">
               <a:rPr lang="es-ES" smtClean="0"/>
-              <a:t>29/03/2022</a:t>
+              <a:t>30/03/2022</a:t>
             </a:fld>
             <a:endParaRPr lang="es-ES"/>
           </a:p>
@@ -2612,7 +2977,7 @@
           <a:p>
             <a:fld id="{B6997077-FBCB-4FA1-BC7A-2BCFA2F1184B}" type="datetimeFigureOut">
               <a:rPr lang="es-ES" smtClean="0"/>
-              <a:t>29/03/2022</a:t>
+              <a:t>30/03/2022</a:t>
             </a:fld>
             <a:endParaRPr lang="es-ES"/>
           </a:p>
@@ -2792,7 +3157,7 @@
           <a:p>
             <a:fld id="{B6997077-FBCB-4FA1-BC7A-2BCFA2F1184B}" type="datetimeFigureOut">
               <a:rPr lang="es-ES" smtClean="0"/>
-              <a:t>29/03/2022</a:t>
+              <a:t>30/03/2022</a:t>
             </a:fld>
             <a:endParaRPr lang="es-ES"/>
           </a:p>
@@ -2968,7 +3333,7 @@
           <a:p>
             <a:fld id="{B6997077-FBCB-4FA1-BC7A-2BCFA2F1184B}" type="datetimeFigureOut">
               <a:rPr lang="es-ES" smtClean="0"/>
-              <a:t>29/03/2022</a:t>
+              <a:t>30/03/2022</a:t>
             </a:fld>
             <a:endParaRPr lang="es-ES"/>
           </a:p>
@@ -3215,7 +3580,7 @@
           <a:p>
             <a:fld id="{B6997077-FBCB-4FA1-BC7A-2BCFA2F1184B}" type="datetimeFigureOut">
               <a:rPr lang="es-ES" smtClean="0"/>
-              <a:t>29/03/2022</a:t>
+              <a:t>30/03/2022</a:t>
             </a:fld>
             <a:endParaRPr lang="es-ES"/>
           </a:p>
@@ -3447,7 +3812,7 @@
           <a:p>
             <a:fld id="{B6997077-FBCB-4FA1-BC7A-2BCFA2F1184B}" type="datetimeFigureOut">
               <a:rPr lang="es-ES" smtClean="0"/>
-              <a:t>29/03/2022</a:t>
+              <a:t>30/03/2022</a:t>
             </a:fld>
             <a:endParaRPr lang="es-ES"/>
           </a:p>
@@ -3821,7 +4186,7 @@
           <a:p>
             <a:fld id="{B6997077-FBCB-4FA1-BC7A-2BCFA2F1184B}" type="datetimeFigureOut">
               <a:rPr lang="es-ES" smtClean="0"/>
-              <a:t>29/03/2022</a:t>
+              <a:t>30/03/2022</a:t>
             </a:fld>
             <a:endParaRPr lang="es-ES"/>
           </a:p>
@@ -3944,7 +4309,7 @@
           <a:p>
             <a:fld id="{B6997077-FBCB-4FA1-BC7A-2BCFA2F1184B}" type="datetimeFigureOut">
               <a:rPr lang="es-ES" smtClean="0"/>
-              <a:t>29/03/2022</a:t>
+              <a:t>30/03/2022</a:t>
             </a:fld>
             <a:endParaRPr lang="es-ES"/>
           </a:p>
@@ -4039,7 +4404,7 @@
           <a:p>
             <a:fld id="{B6997077-FBCB-4FA1-BC7A-2BCFA2F1184B}" type="datetimeFigureOut">
               <a:rPr lang="es-ES" smtClean="0"/>
-              <a:t>29/03/2022</a:t>
+              <a:t>30/03/2022</a:t>
             </a:fld>
             <a:endParaRPr lang="es-ES"/>
           </a:p>
@@ -4294,7 +4659,7 @@
           <a:p>
             <a:fld id="{B6997077-FBCB-4FA1-BC7A-2BCFA2F1184B}" type="datetimeFigureOut">
               <a:rPr lang="es-ES" smtClean="0"/>
-              <a:t>29/03/2022</a:t>
+              <a:t>30/03/2022</a:t>
             </a:fld>
             <a:endParaRPr lang="es-ES"/>
           </a:p>
@@ -4557,7 +4922,7 @@
           <a:p>
             <a:fld id="{B6997077-FBCB-4FA1-BC7A-2BCFA2F1184B}" type="datetimeFigureOut">
               <a:rPr lang="es-ES" smtClean="0"/>
-              <a:t>29/03/2022</a:t>
+              <a:t>30/03/2022</a:t>
             </a:fld>
             <a:endParaRPr lang="es-ES"/>
           </a:p>
@@ -5300,7 +5665,7 @@
           <a:p>
             <a:fld id="{B6997077-FBCB-4FA1-BC7A-2BCFA2F1184B}" type="datetimeFigureOut">
               <a:rPr lang="es-ES" smtClean="0"/>
-              <a:t>29/03/2022</a:t>
+              <a:t>30/03/2022</a:t>
             </a:fld>
             <a:endParaRPr lang="es-ES"/>
           </a:p>
@@ -5974,6 +6339,804 @@
 </p:sld>
 </file>
 
+<file path=ppt/slides/slide2.xml><?xml version="1.0" encoding="utf-8"?>
+<p:sld xmlns:a="http://schemas.openxmlformats.org/drawingml/2006/main" xmlns:r="http://schemas.openxmlformats.org/officeDocument/2006/relationships" xmlns:p="http://schemas.openxmlformats.org/presentationml/2006/main">
+  <p:cSld>
+    <p:spTree>
+      <p:nvGrpSpPr>
+        <p:cNvPr id="1" name=""/>
+        <p:cNvGrpSpPr/>
+        <p:nvPr/>
+      </p:nvGrpSpPr>
+      <p:grpSpPr>
+        <a:xfrm>
+          <a:off x="0" y="0"/>
+          <a:ext cx="0" cy="0"/>
+          <a:chOff x="0" y="0"/>
+          <a:chExt cx="0" cy="0"/>
+        </a:xfrm>
+      </p:grpSpPr>
+      <p:sp>
+        <p:nvSpPr>
+          <p:cNvPr id="2" name="Título 1"/>
+          <p:cNvSpPr>
+            <a:spLocks noGrp="1"/>
+          </p:cNvSpPr>
+          <p:nvPr>
+            <p:ph type="title"/>
+          </p:nvPr>
+        </p:nvSpPr>
+        <p:spPr>
+          <a:xfrm>
+            <a:off x="677334" y="609600"/>
+            <a:ext cx="8596668" cy="2022764"/>
+          </a:xfrm>
+        </p:spPr>
+        <p:txBody>
+          <a:bodyPr>
+            <a:noAutofit/>
+          </a:bodyPr>
+          <a:lstStyle/>
+          <a:p>
+            <a:pPr algn="ctr"/>
+            <a:r>
+              <a:rPr lang="sq-AL" sz="8800" dirty="0" smtClean="0">
+                <a:solidFill>
+                  <a:srgbClr val="FF0000"/>
+                </a:solidFill>
+              </a:rPr>
+              <a:t>Movil</a:t>
+            </a:r>
+            <a:endParaRPr lang="sq-AL" sz="8800" dirty="0">
+              <a:solidFill>
+                <a:srgbClr val="FF0000"/>
+              </a:solidFill>
+            </a:endParaRPr>
+          </a:p>
+        </p:txBody>
+      </p:sp>
+      <p:pic>
+        <p:nvPicPr>
+          <p:cNvPr id="4" name="Marcador de contenido 3"/>
+          <p:cNvPicPr>
+            <a:picLocks noGrp="1" noChangeAspect="1"/>
+          </p:cNvPicPr>
+          <p:nvPr>
+            <p:ph idx="1"/>
+          </p:nvPr>
+        </p:nvPicPr>
+        <p:blipFill>
+          <a:blip r:embed="rId2">
+            <a:extLst>
+              <a:ext uri="{28A0092B-C50C-407E-A947-70E740481C1C}">
+                <a14:useLocalDpi xmlns:a14="http://schemas.microsoft.com/office/drawing/2010/main" val="0"/>
+              </a:ext>
+            </a:extLst>
+          </a:blip>
+          <a:stretch>
+            <a:fillRect/>
+          </a:stretch>
+        </p:blipFill>
+        <p:spPr>
+          <a:xfrm>
+            <a:off x="1145311" y="2881024"/>
+            <a:ext cx="7805160" cy="3881437"/>
+          </a:xfrm>
+          <a:prstGeom prst="rect">
+            <a:avLst/>
+          </a:prstGeom>
+          <a:solidFill>
+            <a:srgbClr val="FFFFFF">
+              <a:shade val="85000"/>
+            </a:srgbClr>
+          </a:solidFill>
+          <a:ln w="88900" cap="sq">
+            <a:solidFill>
+              <a:srgbClr val="FFFFFF"/>
+            </a:solidFill>
+            <a:miter lim="800000"/>
+          </a:ln>
+          <a:effectLst>
+            <a:outerShdw blurRad="55000" dist="18000" dir="5400000" algn="tl" rotWithShape="0">
+              <a:srgbClr val="000000">
+                <a:alpha val="40000"/>
+              </a:srgbClr>
+            </a:outerShdw>
+          </a:effectLst>
+          <a:scene3d>
+            <a:camera prst="orthographicFront"/>
+            <a:lightRig rig="twoPt" dir="t">
+              <a:rot lat="0" lon="0" rev="7200000"/>
+            </a:lightRig>
+          </a:scene3d>
+          <a:sp3d>
+            <a:bevelT w="25400" h="19050"/>
+            <a:contourClr>
+              <a:srgbClr val="FFFFFF"/>
+            </a:contourClr>
+          </a:sp3d>
+        </p:spPr>
+      </p:pic>
+    </p:spTree>
+    <p:extLst>
+      <p:ext uri="{BB962C8B-B14F-4D97-AF65-F5344CB8AC3E}">
+        <p14:creationId xmlns:p14="http://schemas.microsoft.com/office/powerpoint/2010/main" val="4268654206"/>
+      </p:ext>
+    </p:extLst>
+  </p:cSld>
+  <p:clrMapOvr>
+    <a:masterClrMapping/>
+  </p:clrMapOvr>
+</p:sld>
+</file>
+
+<file path=ppt/slides/slide3.xml><?xml version="1.0" encoding="utf-8"?>
+<p:sld xmlns:a="http://schemas.openxmlformats.org/drawingml/2006/main" xmlns:r="http://schemas.openxmlformats.org/officeDocument/2006/relationships" xmlns:p="http://schemas.openxmlformats.org/presentationml/2006/main">
+  <p:cSld>
+    <p:spTree>
+      <p:nvGrpSpPr>
+        <p:cNvPr id="1" name=""/>
+        <p:cNvGrpSpPr/>
+        <p:nvPr/>
+      </p:nvGrpSpPr>
+      <p:grpSpPr>
+        <a:xfrm>
+          <a:off x="0" y="0"/>
+          <a:ext cx="0" cy="0"/>
+          <a:chOff x="0" y="0"/>
+          <a:chExt cx="0" cy="0"/>
+        </a:xfrm>
+      </p:grpSpPr>
+      <p:sp>
+        <p:nvSpPr>
+          <p:cNvPr id="2" name="Título 1"/>
+          <p:cNvSpPr>
+            <a:spLocks noGrp="1"/>
+          </p:cNvSpPr>
+          <p:nvPr>
+            <p:ph type="title"/>
+          </p:nvPr>
+        </p:nvSpPr>
+        <p:spPr>
+          <a:xfrm>
+            <a:off x="317116" y="480291"/>
+            <a:ext cx="8596668" cy="1320800"/>
+          </a:xfrm>
+        </p:spPr>
+        <p:txBody>
+          <a:bodyPr>
+            <a:normAutofit/>
+          </a:bodyPr>
+          <a:lstStyle/>
+          <a:p>
+            <a:pPr algn="ctr"/>
+            <a:r>
+              <a:rPr lang="es-ES" sz="6600" dirty="0" smtClean="0">
+                <a:solidFill>
+                  <a:srgbClr val="FFC000"/>
+                </a:solidFill>
+              </a:rPr>
+              <a:t>Principal</a:t>
+            </a:r>
+            <a:endParaRPr lang="es-ES" sz="6600" dirty="0">
+              <a:solidFill>
+                <a:srgbClr val="FFC000"/>
+              </a:solidFill>
+            </a:endParaRPr>
+          </a:p>
+        </p:txBody>
+      </p:sp>
+      <p:pic>
+        <p:nvPicPr>
+          <p:cNvPr id="4" name="Marcador de contenido 3"/>
+          <p:cNvPicPr>
+            <a:picLocks noGrp="1" noChangeAspect="1"/>
+          </p:cNvPicPr>
+          <p:nvPr>
+            <p:ph idx="1"/>
+          </p:nvPr>
+        </p:nvPicPr>
+        <p:blipFill>
+          <a:blip r:embed="rId2">
+            <a:extLst>
+              <a:ext uri="{28A0092B-C50C-407E-A947-70E740481C1C}">
+                <a14:useLocalDpi xmlns:a14="http://schemas.microsoft.com/office/drawing/2010/main" val="0"/>
+              </a:ext>
+            </a:extLst>
+          </a:blip>
+          <a:stretch>
+            <a:fillRect/>
+          </a:stretch>
+        </p:blipFill>
+        <p:spPr>
+          <a:xfrm>
+            <a:off x="464805" y="2327565"/>
+            <a:ext cx="3377522" cy="4342534"/>
+          </a:xfrm>
+        </p:spPr>
+      </p:pic>
+      <p:sp>
+        <p:nvSpPr>
+          <p:cNvPr id="5" name="CuadroTexto 4"/>
+          <p:cNvSpPr txBox="1"/>
+          <p:nvPr/>
+        </p:nvSpPr>
+        <p:spPr>
+          <a:xfrm>
+            <a:off x="4202547" y="3603120"/>
+            <a:ext cx="5107708" cy="646331"/>
+          </a:xfrm>
+          <a:prstGeom prst="rect">
+            <a:avLst/>
+          </a:prstGeom>
+          <a:noFill/>
+        </p:spPr>
+        <p:txBody>
+          <a:bodyPr wrap="square" rtlCol="0">
+            <a:spAutoFit/>
+          </a:bodyPr>
+          <a:lstStyle/>
+          <a:p>
+            <a:r>
+              <a:rPr lang="es-ES" dirty="0"/>
+              <a:t>Esta seria la idea de pagina principal de nuestro proyecto</a:t>
+            </a:r>
+          </a:p>
+        </p:txBody>
+      </p:sp>
+    </p:spTree>
+    <p:extLst>
+      <p:ext uri="{BB962C8B-B14F-4D97-AF65-F5344CB8AC3E}">
+        <p14:creationId xmlns:p14="http://schemas.microsoft.com/office/powerpoint/2010/main" val="3824733592"/>
+      </p:ext>
+    </p:extLst>
+  </p:cSld>
+  <p:clrMapOvr>
+    <a:masterClrMapping/>
+  </p:clrMapOvr>
+</p:sld>
+</file>
+
+<file path=ppt/slides/slide4.xml><?xml version="1.0" encoding="utf-8"?>
+<p:sld xmlns:a="http://schemas.openxmlformats.org/drawingml/2006/main" xmlns:r="http://schemas.openxmlformats.org/officeDocument/2006/relationships" xmlns:p="http://schemas.openxmlformats.org/presentationml/2006/main">
+  <p:cSld>
+    <p:spTree>
+      <p:nvGrpSpPr>
+        <p:cNvPr id="1" name=""/>
+        <p:cNvGrpSpPr/>
+        <p:nvPr/>
+      </p:nvGrpSpPr>
+      <p:grpSpPr>
+        <a:xfrm>
+          <a:off x="0" y="0"/>
+          <a:ext cx="0" cy="0"/>
+          <a:chOff x="0" y="0"/>
+          <a:chExt cx="0" cy="0"/>
+        </a:xfrm>
+      </p:grpSpPr>
+      <p:sp>
+        <p:nvSpPr>
+          <p:cNvPr id="2" name="Título 1"/>
+          <p:cNvSpPr>
+            <a:spLocks noGrp="1"/>
+          </p:cNvSpPr>
+          <p:nvPr>
+            <p:ph type="title"/>
+          </p:nvPr>
+        </p:nvSpPr>
+        <p:spPr/>
+        <p:txBody>
+          <a:bodyPr>
+            <a:normAutofit/>
+          </a:bodyPr>
+          <a:lstStyle/>
+          <a:p>
+            <a:pPr algn="ctr"/>
+            <a:r>
+              <a:rPr lang="es-ES" sz="6600" dirty="0">
+                <a:solidFill>
+                  <a:srgbClr val="00B0F0"/>
+                </a:solidFill>
+              </a:rPr>
+              <a:t>Menú</a:t>
+            </a:r>
+          </a:p>
+        </p:txBody>
+      </p:sp>
+      <p:pic>
+        <p:nvPicPr>
+          <p:cNvPr id="4" name="Marcador de contenido 3"/>
+          <p:cNvPicPr>
+            <a:picLocks noGrp="1" noChangeAspect="1"/>
+          </p:cNvPicPr>
+          <p:nvPr>
+            <p:ph idx="1"/>
+          </p:nvPr>
+        </p:nvPicPr>
+        <p:blipFill>
+          <a:blip r:embed="rId2">
+            <a:extLst>
+              <a:ext uri="{28A0092B-C50C-407E-A947-70E740481C1C}">
+                <a14:useLocalDpi xmlns:a14="http://schemas.microsoft.com/office/drawing/2010/main" val="0"/>
+              </a:ext>
+            </a:extLst>
+          </a:blip>
+          <a:stretch>
+            <a:fillRect/>
+          </a:stretch>
+        </p:blipFill>
+        <p:spPr>
+          <a:xfrm>
+            <a:off x="1310141" y="2373024"/>
+            <a:ext cx="1863827" cy="3881437"/>
+          </a:xfrm>
+        </p:spPr>
+      </p:pic>
+      <p:sp>
+        <p:nvSpPr>
+          <p:cNvPr id="5" name="CuadroTexto 4"/>
+          <p:cNvSpPr txBox="1"/>
+          <p:nvPr/>
+        </p:nvSpPr>
+        <p:spPr>
+          <a:xfrm>
+            <a:off x="4304145" y="3445164"/>
+            <a:ext cx="3315855" cy="646331"/>
+          </a:xfrm>
+          <a:prstGeom prst="rect">
+            <a:avLst/>
+          </a:prstGeom>
+          <a:noFill/>
+        </p:spPr>
+        <p:txBody>
+          <a:bodyPr wrap="square" rtlCol="0">
+            <a:spAutoFit/>
+          </a:bodyPr>
+          <a:lstStyle/>
+          <a:p>
+            <a:r>
+              <a:rPr lang="es-ES" dirty="0" smtClean="0"/>
+              <a:t>Aquí vemos una principal idea de un menú de nuestra pagina</a:t>
+            </a:r>
+            <a:endParaRPr lang="es-ES" dirty="0"/>
+          </a:p>
+        </p:txBody>
+      </p:sp>
+    </p:spTree>
+    <p:extLst>
+      <p:ext uri="{BB962C8B-B14F-4D97-AF65-F5344CB8AC3E}">
+        <p14:creationId xmlns:p14="http://schemas.microsoft.com/office/powerpoint/2010/main" val="3768827183"/>
+      </p:ext>
+    </p:extLst>
+  </p:cSld>
+  <p:clrMapOvr>
+    <a:masterClrMapping/>
+  </p:clrMapOvr>
+</p:sld>
+</file>
+
+<file path=ppt/slides/slide5.xml><?xml version="1.0" encoding="utf-8"?>
+<p:sld xmlns:a="http://schemas.openxmlformats.org/drawingml/2006/main" xmlns:r="http://schemas.openxmlformats.org/officeDocument/2006/relationships" xmlns:p="http://schemas.openxmlformats.org/presentationml/2006/main">
+  <p:cSld>
+    <p:spTree>
+      <p:nvGrpSpPr>
+        <p:cNvPr id="1" name=""/>
+        <p:cNvGrpSpPr/>
+        <p:nvPr/>
+      </p:nvGrpSpPr>
+      <p:grpSpPr>
+        <a:xfrm>
+          <a:off x="0" y="0"/>
+          <a:ext cx="0" cy="0"/>
+          <a:chOff x="0" y="0"/>
+          <a:chExt cx="0" cy="0"/>
+        </a:xfrm>
+      </p:grpSpPr>
+      <p:sp>
+        <p:nvSpPr>
+          <p:cNvPr id="2" name="Título 1"/>
+          <p:cNvSpPr>
+            <a:spLocks noGrp="1"/>
+          </p:cNvSpPr>
+          <p:nvPr>
+            <p:ph type="title"/>
+          </p:nvPr>
+        </p:nvSpPr>
+        <p:spPr/>
+        <p:txBody>
+          <a:bodyPr>
+            <a:normAutofit/>
+          </a:bodyPr>
+          <a:lstStyle/>
+          <a:p>
+            <a:pPr algn="ctr"/>
+            <a:r>
+              <a:rPr lang="es-ES" sz="8000" dirty="0" smtClean="0">
+                <a:solidFill>
+                  <a:srgbClr val="FF0000"/>
+                </a:solidFill>
+              </a:rPr>
+              <a:t>Noticia</a:t>
+            </a:r>
+            <a:endParaRPr lang="es-ES" sz="8000" dirty="0">
+              <a:solidFill>
+                <a:srgbClr val="FF0000"/>
+              </a:solidFill>
+            </a:endParaRPr>
+          </a:p>
+        </p:txBody>
+      </p:sp>
+      <p:pic>
+        <p:nvPicPr>
+          <p:cNvPr id="4" name="Marcador de contenido 3"/>
+          <p:cNvPicPr>
+            <a:picLocks noGrp="1" noChangeAspect="1"/>
+          </p:cNvPicPr>
+          <p:nvPr>
+            <p:ph idx="1"/>
+          </p:nvPr>
+        </p:nvPicPr>
+        <p:blipFill>
+          <a:blip r:embed="rId2">
+            <a:extLst>
+              <a:ext uri="{28A0092B-C50C-407E-A947-70E740481C1C}">
+                <a14:useLocalDpi xmlns:a14="http://schemas.microsoft.com/office/drawing/2010/main" val="0"/>
+              </a:ext>
+            </a:extLst>
+          </a:blip>
+          <a:stretch>
+            <a:fillRect/>
+          </a:stretch>
+        </p:blipFill>
+        <p:spPr>
+          <a:xfrm>
+            <a:off x="882192" y="2493097"/>
+            <a:ext cx="2433663" cy="3881437"/>
+          </a:xfrm>
+        </p:spPr>
+      </p:pic>
+      <p:sp>
+        <p:nvSpPr>
+          <p:cNvPr id="5" name="CuadroTexto 4"/>
+          <p:cNvSpPr txBox="1"/>
+          <p:nvPr/>
+        </p:nvSpPr>
+        <p:spPr>
+          <a:xfrm>
+            <a:off x="4239491" y="3352800"/>
+            <a:ext cx="3500582" cy="923330"/>
+          </a:xfrm>
+          <a:prstGeom prst="rect">
+            <a:avLst/>
+          </a:prstGeom>
+          <a:noFill/>
+        </p:spPr>
+        <p:txBody>
+          <a:bodyPr wrap="square" rtlCol="0">
+            <a:spAutoFit/>
+          </a:bodyPr>
+          <a:lstStyle/>
+          <a:p>
+            <a:r>
+              <a:rPr lang="es-ES" dirty="0" smtClean="0"/>
+              <a:t>Aquí podemos ver como quedaría la parte de noticias de nuestra pagina</a:t>
+            </a:r>
+            <a:endParaRPr lang="es-ES" dirty="0"/>
+          </a:p>
+        </p:txBody>
+      </p:sp>
+    </p:spTree>
+    <p:extLst>
+      <p:ext uri="{BB962C8B-B14F-4D97-AF65-F5344CB8AC3E}">
+        <p14:creationId xmlns:p14="http://schemas.microsoft.com/office/powerpoint/2010/main" val="2105769093"/>
+      </p:ext>
+    </p:extLst>
+  </p:cSld>
+  <p:clrMapOvr>
+    <a:masterClrMapping/>
+  </p:clrMapOvr>
+</p:sld>
+</file>
+
+<file path=ppt/slides/slide6.xml><?xml version="1.0" encoding="utf-8"?>
+<p:sld xmlns:a="http://schemas.openxmlformats.org/drawingml/2006/main" xmlns:r="http://schemas.openxmlformats.org/officeDocument/2006/relationships" xmlns:p="http://schemas.openxmlformats.org/presentationml/2006/main">
+  <p:cSld>
+    <p:spTree>
+      <p:nvGrpSpPr>
+        <p:cNvPr id="1" name=""/>
+        <p:cNvGrpSpPr/>
+        <p:nvPr/>
+      </p:nvGrpSpPr>
+      <p:grpSpPr>
+        <a:xfrm>
+          <a:off x="0" y="0"/>
+          <a:ext cx="0" cy="0"/>
+          <a:chOff x="0" y="0"/>
+          <a:chExt cx="0" cy="0"/>
+        </a:xfrm>
+      </p:grpSpPr>
+      <p:sp>
+        <p:nvSpPr>
+          <p:cNvPr id="2" name="Título 1"/>
+          <p:cNvSpPr>
+            <a:spLocks noGrp="1"/>
+          </p:cNvSpPr>
+          <p:nvPr>
+            <p:ph type="title"/>
+          </p:nvPr>
+        </p:nvSpPr>
+        <p:spPr/>
+        <p:txBody>
+          <a:bodyPr/>
+          <a:lstStyle/>
+          <a:p>
+            <a:pPr algn="ctr"/>
+            <a:r>
+              <a:rPr lang="es-ES" dirty="0">
+                <a:solidFill>
+                  <a:srgbClr val="00B0F0"/>
+                </a:solidFill>
+              </a:rPr>
+              <a:t>Creador de Noticias</a:t>
+            </a:r>
+          </a:p>
+        </p:txBody>
+      </p:sp>
+      <p:pic>
+        <p:nvPicPr>
+          <p:cNvPr id="4" name="Marcador de contenido 3"/>
+          <p:cNvPicPr>
+            <a:picLocks noGrp="1" noChangeAspect="1"/>
+          </p:cNvPicPr>
+          <p:nvPr>
+            <p:ph idx="1"/>
+          </p:nvPr>
+        </p:nvPicPr>
+        <p:blipFill>
+          <a:blip r:embed="rId2">
+            <a:extLst>
+              <a:ext uri="{28A0092B-C50C-407E-A947-70E740481C1C}">
+                <a14:useLocalDpi xmlns:a14="http://schemas.microsoft.com/office/drawing/2010/main" val="0"/>
+              </a:ext>
+            </a:extLst>
+          </a:blip>
+          <a:stretch>
+            <a:fillRect/>
+          </a:stretch>
+        </p:blipFill>
+        <p:spPr>
+          <a:xfrm>
+            <a:off x="1406780" y="2308370"/>
+            <a:ext cx="2500202" cy="3881437"/>
+          </a:xfrm>
+        </p:spPr>
+      </p:pic>
+      <p:sp>
+        <p:nvSpPr>
+          <p:cNvPr id="5" name="CuadroTexto 4"/>
+          <p:cNvSpPr txBox="1"/>
+          <p:nvPr/>
+        </p:nvSpPr>
+        <p:spPr>
+          <a:xfrm>
+            <a:off x="4849091" y="3325758"/>
+            <a:ext cx="3389745" cy="1815882"/>
+          </a:xfrm>
+          <a:prstGeom prst="rect">
+            <a:avLst/>
+          </a:prstGeom>
+          <a:noFill/>
+        </p:spPr>
+        <p:txBody>
+          <a:bodyPr wrap="square" rtlCol="0">
+            <a:spAutoFit/>
+          </a:bodyPr>
+          <a:lstStyle/>
+          <a:p>
+            <a:r>
+              <a:rPr lang="es-ES" sz="2800" dirty="0"/>
+              <a:t>Aquí podemos ver como crearon las noticias de nuestra pagina</a:t>
+            </a:r>
+          </a:p>
+        </p:txBody>
+      </p:sp>
+    </p:spTree>
+    <p:extLst>
+      <p:ext uri="{BB962C8B-B14F-4D97-AF65-F5344CB8AC3E}">
+        <p14:creationId xmlns:p14="http://schemas.microsoft.com/office/powerpoint/2010/main" val="4210717906"/>
+      </p:ext>
+    </p:extLst>
+  </p:cSld>
+  <p:clrMapOvr>
+    <a:masterClrMapping/>
+  </p:clrMapOvr>
+</p:sld>
+</file>
+
+<file path=ppt/slides/slide7.xml><?xml version="1.0" encoding="utf-8"?>
+<p:sld xmlns:a="http://schemas.openxmlformats.org/drawingml/2006/main" xmlns:r="http://schemas.openxmlformats.org/officeDocument/2006/relationships" xmlns:p="http://schemas.openxmlformats.org/presentationml/2006/main">
+  <p:cSld>
+    <p:spTree>
+      <p:nvGrpSpPr>
+        <p:cNvPr id="1" name=""/>
+        <p:cNvGrpSpPr/>
+        <p:nvPr/>
+      </p:nvGrpSpPr>
+      <p:grpSpPr>
+        <a:xfrm>
+          <a:off x="0" y="0"/>
+          <a:ext cx="0" cy="0"/>
+          <a:chOff x="0" y="0"/>
+          <a:chExt cx="0" cy="0"/>
+        </a:xfrm>
+      </p:grpSpPr>
+      <p:sp>
+        <p:nvSpPr>
+          <p:cNvPr id="2" name="Título 1"/>
+          <p:cNvSpPr>
+            <a:spLocks noGrp="1"/>
+          </p:cNvSpPr>
+          <p:nvPr>
+            <p:ph type="title"/>
+          </p:nvPr>
+        </p:nvSpPr>
+        <p:spPr/>
+        <p:txBody>
+          <a:bodyPr/>
+          <a:lstStyle/>
+          <a:p>
+            <a:pPr algn="ctr"/>
+            <a:r>
+              <a:rPr lang="es-ES" dirty="0">
+                <a:solidFill>
+                  <a:srgbClr val="7030A0"/>
+                </a:solidFill>
+              </a:rPr>
+              <a:t>Comunitario</a:t>
+            </a:r>
+          </a:p>
+        </p:txBody>
+      </p:sp>
+      <p:pic>
+        <p:nvPicPr>
+          <p:cNvPr id="4" name="Marcador de contenido 3"/>
+          <p:cNvPicPr>
+            <a:picLocks noGrp="1" noChangeAspect="1"/>
+          </p:cNvPicPr>
+          <p:nvPr>
+            <p:ph idx="1"/>
+          </p:nvPr>
+        </p:nvPicPr>
+        <p:blipFill>
+          <a:blip r:embed="rId2">
+            <a:extLst>
+              <a:ext uri="{28A0092B-C50C-407E-A947-70E740481C1C}">
+                <a14:useLocalDpi xmlns:a14="http://schemas.microsoft.com/office/drawing/2010/main" val="0"/>
+              </a:ext>
+            </a:extLst>
+          </a:blip>
+          <a:stretch>
+            <a:fillRect/>
+          </a:stretch>
+        </p:blipFill>
+        <p:spPr>
+          <a:xfrm>
+            <a:off x="1762563" y="2373024"/>
+            <a:ext cx="1845675" cy="3881437"/>
+          </a:xfrm>
+        </p:spPr>
+      </p:pic>
+      <p:sp>
+        <p:nvSpPr>
+          <p:cNvPr id="5" name="CuadroTexto 4"/>
+          <p:cNvSpPr txBox="1"/>
+          <p:nvPr/>
+        </p:nvSpPr>
+        <p:spPr>
+          <a:xfrm>
+            <a:off x="4322618" y="3667411"/>
+            <a:ext cx="3999346" cy="646331"/>
+          </a:xfrm>
+          <a:prstGeom prst="rect">
+            <a:avLst/>
+          </a:prstGeom>
+          <a:noFill/>
+        </p:spPr>
+        <p:txBody>
+          <a:bodyPr wrap="square" rtlCol="0">
+            <a:spAutoFit/>
+          </a:bodyPr>
+          <a:lstStyle/>
+          <a:p>
+            <a:r>
+              <a:rPr lang="es-ES" dirty="0" smtClean="0"/>
+              <a:t>Aquí podemos ver la noticias que ponen los usuarios</a:t>
+            </a:r>
+            <a:endParaRPr lang="es-ES" dirty="0"/>
+          </a:p>
+        </p:txBody>
+      </p:sp>
+    </p:spTree>
+    <p:extLst>
+      <p:ext uri="{BB962C8B-B14F-4D97-AF65-F5344CB8AC3E}">
+        <p14:creationId xmlns:p14="http://schemas.microsoft.com/office/powerpoint/2010/main" val="1087288756"/>
+      </p:ext>
+    </p:extLst>
+  </p:cSld>
+  <p:clrMapOvr>
+    <a:masterClrMapping/>
+  </p:clrMapOvr>
+</p:sld>
+</file>
+
+<file path=ppt/slides/slide8.xml><?xml version="1.0" encoding="utf-8"?>
+<p:sld xmlns:a="http://schemas.openxmlformats.org/drawingml/2006/main" xmlns:r="http://schemas.openxmlformats.org/officeDocument/2006/relationships" xmlns:p="http://schemas.openxmlformats.org/presentationml/2006/main">
+  <p:cSld>
+    <p:spTree>
+      <p:nvGrpSpPr>
+        <p:cNvPr id="1" name=""/>
+        <p:cNvGrpSpPr/>
+        <p:nvPr/>
+      </p:nvGrpSpPr>
+      <p:grpSpPr>
+        <a:xfrm>
+          <a:off x="0" y="0"/>
+          <a:ext cx="0" cy="0"/>
+          <a:chOff x="0" y="0"/>
+          <a:chExt cx="0" cy="0"/>
+        </a:xfrm>
+      </p:grpSpPr>
+      <p:sp>
+        <p:nvSpPr>
+          <p:cNvPr id="2" name="Título 1"/>
+          <p:cNvSpPr>
+            <a:spLocks noGrp="1"/>
+          </p:cNvSpPr>
+          <p:nvPr>
+            <p:ph type="title"/>
+          </p:nvPr>
+        </p:nvSpPr>
+        <p:spPr/>
+        <p:txBody>
+          <a:bodyPr/>
+          <a:lstStyle/>
+          <a:p>
+            <a:endParaRPr lang="es-ES"/>
+          </a:p>
+        </p:txBody>
+      </p:sp>
+      <p:sp>
+        <p:nvSpPr>
+          <p:cNvPr id="3" name="Marcador de contenido 2"/>
+          <p:cNvSpPr>
+            <a:spLocks noGrp="1"/>
+          </p:cNvSpPr>
+          <p:nvPr>
+            <p:ph idx="1"/>
+          </p:nvPr>
+        </p:nvSpPr>
+        <p:spPr/>
+        <p:txBody>
+          <a:bodyPr/>
+          <a:lstStyle/>
+          <a:p>
+            <a:endParaRPr lang="es-ES"/>
+          </a:p>
+        </p:txBody>
+      </p:sp>
+    </p:spTree>
+    <p:extLst>
+      <p:ext uri="{BB962C8B-B14F-4D97-AF65-F5344CB8AC3E}">
+        <p14:creationId xmlns:p14="http://schemas.microsoft.com/office/powerpoint/2010/main" val="1251601867"/>
+      </p:ext>
+    </p:extLst>
+  </p:cSld>
+  <p:clrMapOvr>
+    <a:masterClrMapping/>
+  </p:clrMapOvr>
+</p:sld>
+</file>
+
 <file path=ppt/theme/theme1.xml><?xml version="1.0" encoding="utf-8"?>
 <a:theme xmlns:a="http://schemas.openxmlformats.org/drawingml/2006/main" name="Faceta">
   <a:themeElements>
@@ -6229,4 +7392,265 @@
     </a:ext>
   </a:extLst>
 </a:theme>
+</file>
+
+<file path=ppt/theme/theme2.xml><?xml version="1.0" encoding="utf-8"?>
+<a:theme xmlns:a="http://schemas.openxmlformats.org/drawingml/2006/main" name="Tema de Office">
+  <a:themeElements>
+    <a:clrScheme name="Office">
+      <a:dk1>
+        <a:sysClr val="windowText" lastClr="000000"/>
+      </a:dk1>
+      <a:lt1>
+        <a:sysClr val="window" lastClr="FFFFFF"/>
+      </a:lt1>
+      <a:dk2>
+        <a:srgbClr val="44546A"/>
+      </a:dk2>
+      <a:lt2>
+        <a:srgbClr val="E7E6E6"/>
+      </a:lt2>
+      <a:accent1>
+        <a:srgbClr val="5B9BD5"/>
+      </a:accent1>
+      <a:accent2>
+        <a:srgbClr val="ED7D31"/>
+      </a:accent2>
+      <a:accent3>
+        <a:srgbClr val="A5A5A5"/>
+      </a:accent3>
+      <a:accent4>
+        <a:srgbClr val="FFC000"/>
+      </a:accent4>
+      <a:accent5>
+        <a:srgbClr val="4472C4"/>
+      </a:accent5>
+      <a:accent6>
+        <a:srgbClr val="70AD47"/>
+      </a:accent6>
+      <a:hlink>
+        <a:srgbClr val="0563C1"/>
+      </a:hlink>
+      <a:folHlink>
+        <a:srgbClr val="954F72"/>
+      </a:folHlink>
+    </a:clrScheme>
+    <a:fontScheme name="Office">
+      <a:majorFont>
+        <a:latin typeface="Calibri Light" panose="020F0302020204030204"/>
+        <a:ea typeface=""/>
+        <a:cs typeface=""/>
+        <a:font script="Jpan" typeface="游ゴシック Light"/>
+        <a:font script="Hang" typeface="맑은 고딕"/>
+        <a:font script="Hans" typeface="等线 Light"/>
+        <a:font script="Hant" typeface="新細明體"/>
+        <a:font script="Arab" typeface="Times New Roman"/>
+        <a:font script="Hebr" typeface="Times New Roman"/>
+        <a:font script="Thai" typeface="Angsana New"/>
+        <a:font script="Ethi" typeface="Nyala"/>
+        <a:font script="Beng" typeface="Vrinda"/>
+        <a:font script="Gujr" typeface="Shruti"/>
+        <a:font script="Khmr" typeface="MoolBoran"/>
+        <a:font script="Knda" typeface="Tunga"/>
+        <a:font script="Guru" typeface="Raavi"/>
+        <a:font script="Cans" typeface="Euphemia"/>
+        <a:font script="Cher" typeface="Plantagenet Cherokee"/>
+        <a:font script="Yiii" typeface="Microsoft Yi Baiti"/>
+        <a:font script="Tibt" typeface="Microsoft Himalaya"/>
+        <a:font script="Thaa" typeface="MV Boli"/>
+        <a:font script="Deva" typeface="Mangal"/>
+        <a:font script="Telu" typeface="Gautami"/>
+        <a:font script="Taml" typeface="Latha"/>
+        <a:font script="Syrc" typeface="Estrangelo Edessa"/>
+        <a:font script="Orya" typeface="Kalinga"/>
+        <a:font script="Mlym" typeface="Kartika"/>
+        <a:font script="Laoo" typeface="DokChampa"/>
+        <a:font script="Sinh" typeface="Iskoola Pota"/>
+        <a:font script="Mong" typeface="Mongolian Baiti"/>
+        <a:font script="Viet" typeface="Times New Roman"/>
+        <a:font script="Uigh" typeface="Microsoft Uighur"/>
+        <a:font script="Geor" typeface="Sylfaen"/>
+      </a:majorFont>
+      <a:minorFont>
+        <a:latin typeface="Calibri" panose="020F0502020204030204"/>
+        <a:ea typeface=""/>
+        <a:cs typeface=""/>
+        <a:font script="Jpan" typeface="游ゴシック"/>
+        <a:font script="Hang" typeface="맑은 고딕"/>
+        <a:font script="Hans" typeface="等线"/>
+        <a:font script="Hant" typeface="新細明體"/>
+        <a:font script="Arab" typeface="Arial"/>
+        <a:font script="Hebr" typeface="Arial"/>
+        <a:font script="Thai" typeface="Cordia New"/>
+        <a:font script="Ethi" typeface="Nyala"/>
+        <a:font script="Beng" typeface="Vrinda"/>
+        <a:font script="Gujr" typeface="Shruti"/>
+        <a:font script="Khmr" typeface="DaunPenh"/>
+        <a:font script="Knda" typeface="Tunga"/>
+        <a:font script="Guru" typeface="Raavi"/>
+        <a:font script="Cans" typeface="Euphemia"/>
+        <a:font script="Cher" typeface="Plantagenet Cherokee"/>
+        <a:font script="Yiii" typeface="Microsoft Yi Baiti"/>
+        <a:font script="Tibt" typeface="Microsoft Himalaya"/>
+        <a:font script="Thaa" typeface="MV Boli"/>
+        <a:font script="Deva" typeface="Mangal"/>
+        <a:font script="Telu" typeface="Gautami"/>
+        <a:font script="Taml" typeface="Latha"/>
+        <a:font script="Syrc" typeface="Estrangelo Edessa"/>
+        <a:font script="Orya" typeface="Kalinga"/>
+        <a:font script="Mlym" typeface="Kartika"/>
+        <a:font script="Laoo" typeface="DokChampa"/>
+        <a:font script="Sinh" typeface="Iskoola Pota"/>
+        <a:font script="Mong" typeface="Mongolian Baiti"/>
+        <a:font script="Viet" typeface="Arial"/>
+        <a:font script="Uigh" typeface="Microsoft Uighur"/>
+        <a:font script="Geor" typeface="Sylfaen"/>
+      </a:minorFont>
+    </a:fontScheme>
+    <a:fmtScheme name="Office">
+      <a:fillStyleLst>
+        <a:solidFill>
+          <a:schemeClr val="phClr"/>
+        </a:solidFill>
+        <a:gradFill rotWithShape="1">
+          <a:gsLst>
+            <a:gs pos="0">
+              <a:schemeClr val="phClr">
+                <a:lumMod val="110000"/>
+                <a:satMod val="105000"/>
+                <a:tint val="67000"/>
+              </a:schemeClr>
+            </a:gs>
+            <a:gs pos="50000">
+              <a:schemeClr val="phClr">
+                <a:lumMod val="105000"/>
+                <a:satMod val="103000"/>
+                <a:tint val="73000"/>
+              </a:schemeClr>
+            </a:gs>
+            <a:gs pos="100000">
+              <a:schemeClr val="phClr">
+                <a:lumMod val="105000"/>
+                <a:satMod val="109000"/>
+                <a:tint val="81000"/>
+              </a:schemeClr>
+            </a:gs>
+          </a:gsLst>
+          <a:lin ang="5400000" scaled="0"/>
+        </a:gradFill>
+        <a:gradFill rotWithShape="1">
+          <a:gsLst>
+            <a:gs pos="0">
+              <a:schemeClr val="phClr">
+                <a:satMod val="103000"/>
+                <a:lumMod val="102000"/>
+                <a:tint val="94000"/>
+              </a:schemeClr>
+            </a:gs>
+            <a:gs pos="50000">
+              <a:schemeClr val="phClr">
+                <a:satMod val="110000"/>
+                <a:lumMod val="100000"/>
+                <a:shade val="100000"/>
+              </a:schemeClr>
+            </a:gs>
+            <a:gs pos="100000">
+              <a:schemeClr val="phClr">
+                <a:lumMod val="99000"/>
+                <a:satMod val="120000"/>
+                <a:shade val="78000"/>
+              </a:schemeClr>
+            </a:gs>
+          </a:gsLst>
+          <a:lin ang="5400000" scaled="0"/>
+        </a:gradFill>
+      </a:fillStyleLst>
+      <a:lnStyleLst>
+        <a:ln w="6350" cap="flat" cmpd="sng" algn="ctr">
+          <a:solidFill>
+            <a:schemeClr val="phClr"/>
+          </a:solidFill>
+          <a:prstDash val="solid"/>
+          <a:miter lim="800000"/>
+        </a:ln>
+        <a:ln w="12700" cap="flat" cmpd="sng" algn="ctr">
+          <a:solidFill>
+            <a:schemeClr val="phClr"/>
+          </a:solidFill>
+          <a:prstDash val="solid"/>
+          <a:miter lim="800000"/>
+        </a:ln>
+        <a:ln w="19050" cap="flat" cmpd="sng" algn="ctr">
+          <a:solidFill>
+            <a:schemeClr val="phClr"/>
+          </a:solidFill>
+          <a:prstDash val="solid"/>
+          <a:miter lim="800000"/>
+        </a:ln>
+      </a:lnStyleLst>
+      <a:effectStyleLst>
+        <a:effectStyle>
+          <a:effectLst/>
+        </a:effectStyle>
+        <a:effectStyle>
+          <a:effectLst/>
+        </a:effectStyle>
+        <a:effectStyle>
+          <a:effectLst>
+            <a:outerShdw blurRad="57150" dist="19050" dir="5400000" algn="ctr" rotWithShape="0">
+              <a:srgbClr val="000000">
+                <a:alpha val="63000"/>
+              </a:srgbClr>
+            </a:outerShdw>
+          </a:effectLst>
+        </a:effectStyle>
+      </a:effectStyleLst>
+      <a:bgFillStyleLst>
+        <a:solidFill>
+          <a:schemeClr val="phClr"/>
+        </a:solidFill>
+        <a:solidFill>
+          <a:schemeClr val="phClr">
+            <a:tint val="95000"/>
+            <a:satMod val="170000"/>
+          </a:schemeClr>
+        </a:solidFill>
+        <a:gradFill rotWithShape="1">
+          <a:gsLst>
+            <a:gs pos="0">
+              <a:schemeClr val="phClr">
+                <a:tint val="93000"/>
+                <a:satMod val="150000"/>
+                <a:shade val="98000"/>
+                <a:lumMod val="102000"/>
+              </a:schemeClr>
+            </a:gs>
+            <a:gs pos="50000">
+              <a:schemeClr val="phClr">
+                <a:tint val="98000"/>
+                <a:satMod val="130000"/>
+                <a:shade val="90000"/>
+                <a:lumMod val="103000"/>
+              </a:schemeClr>
+            </a:gs>
+            <a:gs pos="100000">
+              <a:schemeClr val="phClr">
+                <a:shade val="63000"/>
+                <a:satMod val="120000"/>
+              </a:schemeClr>
+            </a:gs>
+          </a:gsLst>
+          <a:lin ang="5400000" scaled="0"/>
+        </a:gradFill>
+      </a:bgFillStyleLst>
+    </a:fmtScheme>
+  </a:themeElements>
+  <a:objectDefaults/>
+  <a:extraClrSchemeLst/>
+  <a:extLst>
+    <a:ext uri="{05A4C25C-085E-4340-85A3-A5531E510DB2}">
+      <thm15:themeFamily xmlns:thm15="http://schemas.microsoft.com/office/thememl/2012/main" name="Office Theme" id="{62F939B6-93AF-4DB8-9C6B-D6C7DFDC589F}" vid="{4A3C46E8-61CC-4603-A589-7422A47A8E4A}"/>
+    </a:ext>
+  </a:extLst>
+</a:theme>
 </file>
</xml_diff>

<commit_message>
he acabado el power para mañana
</commit_message>
<xml_diff>
--- a/carles/poryecto integrado.pptx
+++ b/carles/poryecto integrado.pptx
@@ -5,17 +5,22 @@
     <p:sldMasterId id="2147483748" r:id="rId1"/>
   </p:sldMasterIdLst>
   <p:notesMasterIdLst>
-    <p:notesMasterId r:id="rId10"/>
+    <p:notesMasterId r:id="rId15"/>
   </p:notesMasterIdLst>
   <p:sldIdLst>
     <p:sldId id="256" r:id="rId2"/>
     <p:sldId id="257" r:id="rId3"/>
     <p:sldId id="262" r:id="rId4"/>
-    <p:sldId id="258" r:id="rId5"/>
-    <p:sldId id="259" r:id="rId6"/>
-    <p:sldId id="260" r:id="rId7"/>
-    <p:sldId id="261" r:id="rId8"/>
-    <p:sldId id="263" r:id="rId9"/>
+    <p:sldId id="264" r:id="rId5"/>
+    <p:sldId id="258" r:id="rId6"/>
+    <p:sldId id="265" r:id="rId7"/>
+    <p:sldId id="259" r:id="rId8"/>
+    <p:sldId id="266" r:id="rId9"/>
+    <p:sldId id="260" r:id="rId10"/>
+    <p:sldId id="267" r:id="rId11"/>
+    <p:sldId id="261" r:id="rId12"/>
+    <p:sldId id="263" r:id="rId13"/>
+    <p:sldId id="268" r:id="rId14"/>
   </p:sldIdLst>
   <p:sldSz cx="12192000" cy="6858000"/>
   <p:notesSz cx="6858000" cy="9144000"/>
@@ -6339,6 +6344,367 @@
 </p:sld>
 </file>
 
+<file path=ppt/slides/slide10.xml><?xml version="1.0" encoding="utf-8"?>
+<p:sld xmlns:a="http://schemas.openxmlformats.org/drawingml/2006/main" xmlns:r="http://schemas.openxmlformats.org/officeDocument/2006/relationships" xmlns:p="http://schemas.openxmlformats.org/presentationml/2006/main">
+  <p:cSld>
+    <p:spTree>
+      <p:nvGrpSpPr>
+        <p:cNvPr id="1" name=""/>
+        <p:cNvGrpSpPr/>
+        <p:nvPr/>
+      </p:nvGrpSpPr>
+      <p:grpSpPr>
+        <a:xfrm>
+          <a:off x="0" y="0"/>
+          <a:ext cx="0" cy="0"/>
+          <a:chOff x="0" y="0"/>
+          <a:chExt cx="0" cy="0"/>
+        </a:xfrm>
+      </p:grpSpPr>
+      <p:sp>
+        <p:nvSpPr>
+          <p:cNvPr id="2" name="Título 1"/>
+          <p:cNvSpPr>
+            <a:spLocks noGrp="1"/>
+          </p:cNvSpPr>
+          <p:nvPr>
+            <p:ph type="title"/>
+          </p:nvPr>
+        </p:nvSpPr>
+        <p:spPr/>
+        <p:txBody>
+          <a:bodyPr>
+            <a:normAutofit/>
+          </a:bodyPr>
+          <a:lstStyle/>
+          <a:p>
+            <a:pPr algn="ctr"/>
+            <a:r>
+              <a:rPr lang="es-ES" sz="7200" dirty="0" smtClean="0">
+                <a:solidFill>
+                  <a:srgbClr val="00B0F0"/>
+                </a:solidFill>
+              </a:rPr>
+              <a:t>PC</a:t>
+            </a:r>
+            <a:endParaRPr lang="es-ES" sz="7200" dirty="0">
+              <a:solidFill>
+                <a:srgbClr val="00B0F0"/>
+              </a:solidFill>
+            </a:endParaRPr>
+          </a:p>
+        </p:txBody>
+      </p:sp>
+      <p:pic>
+        <p:nvPicPr>
+          <p:cNvPr id="4" name="Marcador de contenido 3"/>
+          <p:cNvPicPr>
+            <a:picLocks noGrp="1" noChangeAspect="1"/>
+          </p:cNvPicPr>
+          <p:nvPr>
+            <p:ph idx="1"/>
+          </p:nvPr>
+        </p:nvPicPr>
+        <p:blipFill>
+          <a:blip r:embed="rId2">
+            <a:extLst>
+              <a:ext uri="{28A0092B-C50C-407E-A947-70E740481C1C}">
+                <a14:useLocalDpi xmlns:a14="http://schemas.microsoft.com/office/drawing/2010/main" val="0"/>
+              </a:ext>
+            </a:extLst>
+          </a:blip>
+          <a:stretch>
+            <a:fillRect/>
+          </a:stretch>
+        </p:blipFill>
+        <p:spPr>
+          <a:xfrm>
+            <a:off x="1842415" y="2160588"/>
+            <a:ext cx="6267207" cy="3881437"/>
+          </a:xfrm>
+        </p:spPr>
+      </p:pic>
+    </p:spTree>
+    <p:extLst>
+      <p:ext uri="{BB962C8B-B14F-4D97-AF65-F5344CB8AC3E}">
+        <p14:creationId xmlns:p14="http://schemas.microsoft.com/office/powerpoint/2010/main" val="2408617136"/>
+      </p:ext>
+    </p:extLst>
+  </p:cSld>
+  <p:clrMapOvr>
+    <a:masterClrMapping/>
+  </p:clrMapOvr>
+</p:sld>
+</file>
+
+<file path=ppt/slides/slide11.xml><?xml version="1.0" encoding="utf-8"?>
+<p:sld xmlns:a="http://schemas.openxmlformats.org/drawingml/2006/main" xmlns:r="http://schemas.openxmlformats.org/officeDocument/2006/relationships" xmlns:p="http://schemas.openxmlformats.org/presentationml/2006/main">
+  <p:cSld>
+    <p:spTree>
+      <p:nvGrpSpPr>
+        <p:cNvPr id="1" name=""/>
+        <p:cNvGrpSpPr/>
+        <p:nvPr/>
+      </p:nvGrpSpPr>
+      <p:grpSpPr>
+        <a:xfrm>
+          <a:off x="0" y="0"/>
+          <a:ext cx="0" cy="0"/>
+          <a:chOff x="0" y="0"/>
+          <a:chExt cx="0" cy="0"/>
+        </a:xfrm>
+      </p:grpSpPr>
+      <p:sp>
+        <p:nvSpPr>
+          <p:cNvPr id="2" name="Título 1"/>
+          <p:cNvSpPr>
+            <a:spLocks noGrp="1"/>
+          </p:cNvSpPr>
+          <p:nvPr>
+            <p:ph type="title"/>
+          </p:nvPr>
+        </p:nvSpPr>
+        <p:spPr/>
+        <p:txBody>
+          <a:bodyPr/>
+          <a:lstStyle/>
+          <a:p>
+            <a:pPr algn="ctr"/>
+            <a:r>
+              <a:rPr lang="es-ES" dirty="0">
+                <a:solidFill>
+                  <a:srgbClr val="7030A0"/>
+                </a:solidFill>
+              </a:rPr>
+              <a:t>Comunitario</a:t>
+            </a:r>
+          </a:p>
+        </p:txBody>
+      </p:sp>
+      <p:pic>
+        <p:nvPicPr>
+          <p:cNvPr id="4" name="Marcador de contenido 3"/>
+          <p:cNvPicPr>
+            <a:picLocks noGrp="1" noChangeAspect="1"/>
+          </p:cNvPicPr>
+          <p:nvPr>
+            <p:ph idx="1"/>
+          </p:nvPr>
+        </p:nvPicPr>
+        <p:blipFill>
+          <a:blip r:embed="rId2">
+            <a:extLst>
+              <a:ext uri="{28A0092B-C50C-407E-A947-70E740481C1C}">
+                <a14:useLocalDpi xmlns:a14="http://schemas.microsoft.com/office/drawing/2010/main" val="0"/>
+              </a:ext>
+            </a:extLst>
+          </a:blip>
+          <a:stretch>
+            <a:fillRect/>
+          </a:stretch>
+        </p:blipFill>
+        <p:spPr>
+          <a:xfrm>
+            <a:off x="1762563" y="2373024"/>
+            <a:ext cx="1845675" cy="3881437"/>
+          </a:xfrm>
+        </p:spPr>
+      </p:pic>
+      <p:sp>
+        <p:nvSpPr>
+          <p:cNvPr id="5" name="CuadroTexto 4"/>
+          <p:cNvSpPr txBox="1"/>
+          <p:nvPr/>
+        </p:nvSpPr>
+        <p:spPr>
+          <a:xfrm>
+            <a:off x="4322618" y="3667411"/>
+            <a:ext cx="3999346" cy="646331"/>
+          </a:xfrm>
+          <a:prstGeom prst="rect">
+            <a:avLst/>
+          </a:prstGeom>
+          <a:noFill/>
+        </p:spPr>
+        <p:txBody>
+          <a:bodyPr wrap="square" rtlCol="0">
+            <a:spAutoFit/>
+          </a:bodyPr>
+          <a:lstStyle/>
+          <a:p>
+            <a:r>
+              <a:rPr lang="es-ES" dirty="0" smtClean="0"/>
+              <a:t>Aquí podemos ver la noticias que ponen los usuarios</a:t>
+            </a:r>
+            <a:endParaRPr lang="es-ES" dirty="0"/>
+          </a:p>
+        </p:txBody>
+      </p:sp>
+    </p:spTree>
+    <p:extLst>
+      <p:ext uri="{BB962C8B-B14F-4D97-AF65-F5344CB8AC3E}">
+        <p14:creationId xmlns:p14="http://schemas.microsoft.com/office/powerpoint/2010/main" val="1087288756"/>
+      </p:ext>
+    </p:extLst>
+  </p:cSld>
+  <p:clrMapOvr>
+    <a:masterClrMapping/>
+  </p:clrMapOvr>
+</p:sld>
+</file>
+
+<file path=ppt/slides/slide12.xml><?xml version="1.0" encoding="utf-8"?>
+<p:sld xmlns:a="http://schemas.openxmlformats.org/drawingml/2006/main" xmlns:r="http://schemas.openxmlformats.org/officeDocument/2006/relationships" xmlns:p="http://schemas.openxmlformats.org/presentationml/2006/main">
+  <p:cSld>
+    <p:spTree>
+      <p:nvGrpSpPr>
+        <p:cNvPr id="1" name=""/>
+        <p:cNvGrpSpPr/>
+        <p:nvPr/>
+      </p:nvGrpSpPr>
+      <p:grpSpPr>
+        <a:xfrm>
+          <a:off x="0" y="0"/>
+          <a:ext cx="0" cy="0"/>
+          <a:chOff x="0" y="0"/>
+          <a:chExt cx="0" cy="0"/>
+        </a:xfrm>
+      </p:grpSpPr>
+      <p:sp>
+        <p:nvSpPr>
+          <p:cNvPr id="2" name="Título 1"/>
+          <p:cNvSpPr>
+            <a:spLocks noGrp="1"/>
+          </p:cNvSpPr>
+          <p:nvPr>
+            <p:ph type="title"/>
+          </p:nvPr>
+        </p:nvSpPr>
+        <p:spPr/>
+        <p:txBody>
+          <a:bodyPr>
+            <a:normAutofit/>
+          </a:bodyPr>
+          <a:lstStyle/>
+          <a:p>
+            <a:pPr algn="ctr"/>
+            <a:r>
+              <a:rPr lang="es-ES" sz="6600" dirty="0" smtClean="0">
+                <a:solidFill>
+                  <a:srgbClr val="7030A0"/>
+                </a:solidFill>
+              </a:rPr>
+              <a:t>PC</a:t>
+            </a:r>
+            <a:endParaRPr lang="es-ES" sz="6600" dirty="0">
+              <a:solidFill>
+                <a:srgbClr val="7030A0"/>
+              </a:solidFill>
+            </a:endParaRPr>
+          </a:p>
+        </p:txBody>
+      </p:sp>
+      <p:pic>
+        <p:nvPicPr>
+          <p:cNvPr id="4" name="Marcador de contenido 3"/>
+          <p:cNvPicPr>
+            <a:picLocks noGrp="1" noChangeAspect="1"/>
+          </p:cNvPicPr>
+          <p:nvPr>
+            <p:ph idx="1"/>
+          </p:nvPr>
+        </p:nvPicPr>
+        <p:blipFill>
+          <a:blip r:embed="rId2">
+            <a:extLst>
+              <a:ext uri="{28A0092B-C50C-407E-A947-70E740481C1C}">
+                <a14:useLocalDpi xmlns:a14="http://schemas.microsoft.com/office/drawing/2010/main" val="0"/>
+              </a:ext>
+            </a:extLst>
+          </a:blip>
+          <a:stretch>
+            <a:fillRect/>
+          </a:stretch>
+        </p:blipFill>
+        <p:spPr>
+          <a:xfrm>
+            <a:off x="2366737" y="2377422"/>
+            <a:ext cx="5532599" cy="3429297"/>
+          </a:xfrm>
+        </p:spPr>
+      </p:pic>
+    </p:spTree>
+    <p:extLst>
+      <p:ext uri="{BB962C8B-B14F-4D97-AF65-F5344CB8AC3E}">
+        <p14:creationId xmlns:p14="http://schemas.microsoft.com/office/powerpoint/2010/main" val="1251601867"/>
+      </p:ext>
+    </p:extLst>
+  </p:cSld>
+  <p:clrMapOvr>
+    <a:masterClrMapping/>
+  </p:clrMapOvr>
+</p:sld>
+</file>
+
+<file path=ppt/slides/slide13.xml><?xml version="1.0" encoding="utf-8"?>
+<p:sld xmlns:a="http://schemas.openxmlformats.org/drawingml/2006/main" xmlns:r="http://schemas.openxmlformats.org/officeDocument/2006/relationships" xmlns:p="http://schemas.openxmlformats.org/presentationml/2006/main">
+  <p:cSld>
+    <p:spTree>
+      <p:nvGrpSpPr>
+        <p:cNvPr id="1" name=""/>
+        <p:cNvGrpSpPr/>
+        <p:nvPr/>
+      </p:nvGrpSpPr>
+      <p:grpSpPr>
+        <a:xfrm>
+          <a:off x="0" y="0"/>
+          <a:ext cx="0" cy="0"/>
+          <a:chOff x="0" y="0"/>
+          <a:chExt cx="0" cy="0"/>
+        </a:xfrm>
+      </p:grpSpPr>
+      <p:pic>
+        <p:nvPicPr>
+          <p:cNvPr id="4" name="Marcador de contenido 3"/>
+          <p:cNvPicPr>
+            <a:picLocks noGrp="1" noChangeAspect="1"/>
+          </p:cNvPicPr>
+          <p:nvPr>
+            <p:ph idx="1"/>
+          </p:nvPr>
+        </p:nvPicPr>
+        <p:blipFill>
+          <a:blip r:embed="rId2" cstate="print">
+            <a:extLst>
+              <a:ext uri="{28A0092B-C50C-407E-A947-70E740481C1C}">
+                <a14:useLocalDpi xmlns:a14="http://schemas.microsoft.com/office/drawing/2010/main" val="0"/>
+              </a:ext>
+            </a:extLst>
+          </a:blip>
+          <a:stretch>
+            <a:fillRect/>
+          </a:stretch>
+        </p:blipFill>
+        <p:spPr>
+          <a:xfrm>
+            <a:off x="2193795" y="1132738"/>
+            <a:ext cx="5223005" cy="3864134"/>
+          </a:xfrm>
+        </p:spPr>
+      </p:pic>
+    </p:spTree>
+    <p:extLst>
+      <p:ext uri="{BB962C8B-B14F-4D97-AF65-F5344CB8AC3E}">
+        <p14:creationId xmlns:p14="http://schemas.microsoft.com/office/powerpoint/2010/main" val="2450015414"/>
+      </p:ext>
+    </p:extLst>
+  </p:cSld>
+  <p:clrMapOvr>
+    <a:masterClrMapping/>
+  </p:clrMapOvr>
+</p:sld>
+</file>
+
 <file path=ppt/slides/slide2.xml><?xml version="1.0" encoding="utf-8"?>
 <p:sld xmlns:a="http://schemas.openxmlformats.org/drawingml/2006/main" xmlns:r="http://schemas.openxmlformats.org/officeDocument/2006/relationships" xmlns:p="http://schemas.openxmlformats.org/presentationml/2006/main">
   <p:cSld>
@@ -6633,13 +6999,18 @@
           <a:p>
             <a:pPr algn="ctr"/>
             <a:r>
-              <a:rPr lang="es-ES" sz="6600" dirty="0">
-                <a:solidFill>
-                  <a:srgbClr val="00B0F0"/>
+              <a:rPr lang="es-ES" sz="6600" dirty="0" smtClean="0">
+                <a:solidFill>
+                  <a:srgbClr val="FFC000"/>
                 </a:solidFill>
               </a:rPr>
-              <a:t>Menú</a:t>
-            </a:r>
+              <a:t>PC</a:t>
+            </a:r>
+            <a:endParaRPr lang="es-ES" sz="6600" dirty="0">
+              <a:solidFill>
+                <a:srgbClr val="FFC000"/>
+              </a:solidFill>
+            </a:endParaRPr>
           </a:p>
         </p:txBody>
       </p:sp>
@@ -6667,45 +7038,15 @@
         </p:blipFill>
         <p:spPr>
           <a:xfrm>
-            <a:off x="1310141" y="2373024"/>
-            <a:ext cx="1863827" cy="3881437"/>
+            <a:off x="1844076" y="2160588"/>
+            <a:ext cx="6263885" cy="3881437"/>
           </a:xfrm>
         </p:spPr>
       </p:pic>
-      <p:sp>
-        <p:nvSpPr>
-          <p:cNvPr id="5" name="CuadroTexto 4"/>
-          <p:cNvSpPr txBox="1"/>
-          <p:nvPr/>
-        </p:nvSpPr>
-        <p:spPr>
-          <a:xfrm>
-            <a:off x="4304145" y="3445164"/>
-            <a:ext cx="3315855" cy="646331"/>
-          </a:xfrm>
-          <a:prstGeom prst="rect">
-            <a:avLst/>
-          </a:prstGeom>
-          <a:noFill/>
-        </p:spPr>
-        <p:txBody>
-          <a:bodyPr wrap="square" rtlCol="0">
-            <a:spAutoFit/>
-          </a:bodyPr>
-          <a:lstStyle/>
-          <a:p>
-            <a:r>
-              <a:rPr lang="es-ES" dirty="0" smtClean="0"/>
-              <a:t>Aquí vemos una principal idea de un menú de nuestra pagina</a:t>
-            </a:r>
-            <a:endParaRPr lang="es-ES" dirty="0"/>
-          </a:p>
-        </p:txBody>
-      </p:sp>
     </p:spTree>
     <p:extLst>
       <p:ext uri="{BB962C8B-B14F-4D97-AF65-F5344CB8AC3E}">
-        <p14:creationId xmlns:p14="http://schemas.microsoft.com/office/powerpoint/2010/main" val="3768827183"/>
+        <p14:creationId xmlns:p14="http://schemas.microsoft.com/office/powerpoint/2010/main" val="1244383784"/>
       </p:ext>
     </p:extLst>
   </p:cSld>
@@ -6751,18 +7092,13 @@
           <a:p>
             <a:pPr algn="ctr"/>
             <a:r>
-              <a:rPr lang="es-ES" sz="8000" dirty="0" smtClean="0">
-                <a:solidFill>
-                  <a:srgbClr val="FF0000"/>
+              <a:rPr lang="es-ES" sz="6600" dirty="0">
+                <a:solidFill>
+                  <a:srgbClr val="00B0F0"/>
                 </a:solidFill>
               </a:rPr>
-              <a:t>Noticia</a:t>
-            </a:r>
-            <a:endParaRPr lang="es-ES" sz="8000" dirty="0">
-              <a:solidFill>
-                <a:srgbClr val="FF0000"/>
-              </a:solidFill>
-            </a:endParaRPr>
+              <a:t>Menú</a:t>
+            </a:r>
           </a:p>
         </p:txBody>
       </p:sp>
@@ -6790,8 +7126,8 @@
         </p:blipFill>
         <p:spPr>
           <a:xfrm>
-            <a:off x="882192" y="2493097"/>
-            <a:ext cx="2433663" cy="3881437"/>
+            <a:off x="1310141" y="2373024"/>
+            <a:ext cx="1863827" cy="3881437"/>
           </a:xfrm>
         </p:spPr>
       </p:pic>
@@ -6803,8 +7139,8 @@
         </p:nvSpPr>
         <p:spPr>
           <a:xfrm>
-            <a:off x="4239491" y="3352800"/>
-            <a:ext cx="3500582" cy="923330"/>
+            <a:off x="4304145" y="3445164"/>
+            <a:ext cx="3315855" cy="646331"/>
           </a:xfrm>
           <a:prstGeom prst="rect">
             <a:avLst/>
@@ -6819,7 +7155,7 @@
           <a:p>
             <a:r>
               <a:rPr lang="es-ES" dirty="0" smtClean="0"/>
-              <a:t>Aquí podemos ver como quedaría la parte de noticias de nuestra pagina</a:t>
+              <a:t>Aquí vemos una principal idea de un menú de nuestra pagina</a:t>
             </a:r>
             <a:endParaRPr lang="es-ES" dirty="0"/>
           </a:p>
@@ -6828,7 +7164,7 @@
     </p:spTree>
     <p:extLst>
       <p:ext uri="{BB962C8B-B14F-4D97-AF65-F5344CB8AC3E}">
-        <p14:creationId xmlns:p14="http://schemas.microsoft.com/office/powerpoint/2010/main" val="2105769093"/>
+        <p14:creationId xmlns:p14="http://schemas.microsoft.com/office/powerpoint/2010/main" val="3768827183"/>
       </p:ext>
     </p:extLst>
   </p:cSld>
@@ -6867,18 +7203,25 @@
         </p:nvSpPr>
         <p:spPr/>
         <p:txBody>
-          <a:bodyPr/>
+          <a:bodyPr>
+            <a:normAutofit/>
+          </a:bodyPr>
           <a:lstStyle/>
           <a:p>
             <a:pPr algn="ctr"/>
             <a:r>
-              <a:rPr lang="es-ES" dirty="0">
+              <a:rPr lang="es-ES" sz="6000" dirty="0" smtClean="0">
                 <a:solidFill>
                   <a:srgbClr val="00B0F0"/>
                 </a:solidFill>
               </a:rPr>
-              <a:t>Creador de Noticias</a:t>
-            </a:r>
+              <a:t>PC</a:t>
+            </a:r>
+            <a:endParaRPr lang="es-ES" sz="6000" dirty="0">
+              <a:solidFill>
+                <a:srgbClr val="00B0F0"/>
+              </a:solidFill>
+            </a:endParaRPr>
           </a:p>
         </p:txBody>
       </p:sp>
@@ -6906,44 +7249,15 @@
         </p:blipFill>
         <p:spPr>
           <a:xfrm>
-            <a:off x="1406780" y="2308370"/>
-            <a:ext cx="2500202" cy="3881437"/>
+            <a:off x="761794" y="2238055"/>
+            <a:ext cx="8428450" cy="3726503"/>
           </a:xfrm>
         </p:spPr>
       </p:pic>
-      <p:sp>
-        <p:nvSpPr>
-          <p:cNvPr id="5" name="CuadroTexto 4"/>
-          <p:cNvSpPr txBox="1"/>
-          <p:nvPr/>
-        </p:nvSpPr>
-        <p:spPr>
-          <a:xfrm>
-            <a:off x="4849091" y="3325758"/>
-            <a:ext cx="3389745" cy="1815882"/>
-          </a:xfrm>
-          <a:prstGeom prst="rect">
-            <a:avLst/>
-          </a:prstGeom>
-          <a:noFill/>
-        </p:spPr>
-        <p:txBody>
-          <a:bodyPr wrap="square" rtlCol="0">
-            <a:spAutoFit/>
-          </a:bodyPr>
-          <a:lstStyle/>
-          <a:p>
-            <a:r>
-              <a:rPr lang="es-ES" sz="2800" dirty="0"/>
-              <a:t>Aquí podemos ver como crearon las noticias de nuestra pagina</a:t>
-            </a:r>
-          </a:p>
-        </p:txBody>
-      </p:sp>
     </p:spTree>
     <p:extLst>
       <p:ext uri="{BB962C8B-B14F-4D97-AF65-F5344CB8AC3E}">
-        <p14:creationId xmlns:p14="http://schemas.microsoft.com/office/powerpoint/2010/main" val="4210717906"/>
+        <p14:creationId xmlns:p14="http://schemas.microsoft.com/office/powerpoint/2010/main" val="3269143219"/>
       </p:ext>
     </p:extLst>
   </p:cSld>
@@ -6982,18 +7296,25 @@
         </p:nvSpPr>
         <p:spPr/>
         <p:txBody>
-          <a:bodyPr/>
+          <a:bodyPr>
+            <a:normAutofit/>
+          </a:bodyPr>
           <a:lstStyle/>
           <a:p>
             <a:pPr algn="ctr"/>
             <a:r>
-              <a:rPr lang="es-ES" dirty="0">
-                <a:solidFill>
-                  <a:srgbClr val="7030A0"/>
+              <a:rPr lang="es-ES" sz="8000" dirty="0" smtClean="0">
+                <a:solidFill>
+                  <a:srgbClr val="FF0000"/>
                 </a:solidFill>
               </a:rPr>
-              <a:t>Comunitario</a:t>
-            </a:r>
+              <a:t>Noticia</a:t>
+            </a:r>
+            <a:endParaRPr lang="es-ES" sz="8000" dirty="0">
+              <a:solidFill>
+                <a:srgbClr val="FF0000"/>
+              </a:solidFill>
+            </a:endParaRPr>
           </a:p>
         </p:txBody>
       </p:sp>
@@ -7021,8 +7342,8 @@
         </p:blipFill>
         <p:spPr>
           <a:xfrm>
-            <a:off x="1762563" y="2373024"/>
-            <a:ext cx="1845675" cy="3881437"/>
+            <a:off x="882192" y="2493097"/>
+            <a:ext cx="2433663" cy="3881437"/>
           </a:xfrm>
         </p:spPr>
       </p:pic>
@@ -7034,8 +7355,8 @@
         </p:nvSpPr>
         <p:spPr>
           <a:xfrm>
-            <a:off x="4322618" y="3667411"/>
-            <a:ext cx="3999346" cy="646331"/>
+            <a:off x="4239491" y="3352800"/>
+            <a:ext cx="3500582" cy="923330"/>
           </a:xfrm>
           <a:prstGeom prst="rect">
             <a:avLst/>
@@ -7050,7 +7371,7 @@
           <a:p>
             <a:r>
               <a:rPr lang="es-ES" dirty="0" smtClean="0"/>
-              <a:t>Aquí podemos ver la noticias que ponen los usuarios</a:t>
+              <a:t>Aquí podemos ver como quedaría la parte de noticias de nuestra pagina</a:t>
             </a:r>
             <a:endParaRPr lang="es-ES" dirty="0"/>
           </a:p>
@@ -7059,7 +7380,7 @@
     </p:spTree>
     <p:extLst>
       <p:ext uri="{BB962C8B-B14F-4D97-AF65-F5344CB8AC3E}">
-        <p14:creationId xmlns:p14="http://schemas.microsoft.com/office/powerpoint/2010/main" val="1087288756"/>
+        <p14:creationId xmlns:p14="http://schemas.microsoft.com/office/powerpoint/2010/main" val="2105769093"/>
       </p:ext>
     </p:extLst>
   </p:cSld>
@@ -7101,33 +7422,171 @@
           <a:bodyPr/>
           <a:lstStyle/>
           <a:p>
-            <a:endParaRPr lang="es-ES"/>
-          </a:p>
-        </p:txBody>
-      </p:sp>
-      <p:sp>
-        <p:nvSpPr>
-          <p:cNvPr id="3" name="Marcador de contenido 2"/>
-          <p:cNvSpPr>
-            <a:spLocks noGrp="1"/>
-          </p:cNvSpPr>
+            <a:pPr algn="ctr"/>
+            <a:r>
+              <a:rPr lang="es-ES" sz="6600" dirty="0" smtClean="0">
+                <a:solidFill>
+                  <a:srgbClr val="FF0000"/>
+                </a:solidFill>
+              </a:rPr>
+              <a:t>PC</a:t>
+            </a:r>
+            <a:endParaRPr lang="es-ES" sz="6600" dirty="0">
+              <a:solidFill>
+                <a:srgbClr val="FF0000"/>
+              </a:solidFill>
+            </a:endParaRPr>
+          </a:p>
+        </p:txBody>
+      </p:sp>
+      <p:pic>
+        <p:nvPicPr>
+          <p:cNvPr id="4" name="Marcador de contenido 3"/>
+          <p:cNvPicPr>
+            <a:picLocks noGrp="1" noChangeAspect="1"/>
+          </p:cNvPicPr>
           <p:nvPr>
             <p:ph idx="1"/>
           </p:nvPr>
-        </p:nvSpPr>
-        <p:spPr/>
-        <p:txBody>
-          <a:bodyPr/>
-          <a:lstStyle/>
-          <a:p>
-            <a:endParaRPr lang="es-ES"/>
-          </a:p>
-        </p:txBody>
-      </p:sp>
+        </p:nvPicPr>
+        <p:blipFill>
+          <a:blip r:embed="rId2">
+            <a:extLst>
+              <a:ext uri="{28A0092B-C50C-407E-A947-70E740481C1C}">
+                <a14:useLocalDpi xmlns:a14="http://schemas.microsoft.com/office/drawing/2010/main" val="0"/>
+              </a:ext>
+            </a:extLst>
+          </a:blip>
+          <a:stretch>
+            <a:fillRect/>
+          </a:stretch>
+        </p:blipFill>
+        <p:spPr>
+          <a:xfrm>
+            <a:off x="1866459" y="2160588"/>
+            <a:ext cx="6219120" cy="3881437"/>
+          </a:xfrm>
+        </p:spPr>
+      </p:pic>
     </p:spTree>
     <p:extLst>
       <p:ext uri="{BB962C8B-B14F-4D97-AF65-F5344CB8AC3E}">
-        <p14:creationId xmlns:p14="http://schemas.microsoft.com/office/powerpoint/2010/main" val="1251601867"/>
+        <p14:creationId xmlns:p14="http://schemas.microsoft.com/office/powerpoint/2010/main" val="3068362208"/>
+      </p:ext>
+    </p:extLst>
+  </p:cSld>
+  <p:clrMapOvr>
+    <a:masterClrMapping/>
+  </p:clrMapOvr>
+</p:sld>
+</file>
+
+<file path=ppt/slides/slide9.xml><?xml version="1.0" encoding="utf-8"?>
+<p:sld xmlns:a="http://schemas.openxmlformats.org/drawingml/2006/main" xmlns:r="http://schemas.openxmlformats.org/officeDocument/2006/relationships" xmlns:p="http://schemas.openxmlformats.org/presentationml/2006/main">
+  <p:cSld>
+    <p:spTree>
+      <p:nvGrpSpPr>
+        <p:cNvPr id="1" name=""/>
+        <p:cNvGrpSpPr/>
+        <p:nvPr/>
+      </p:nvGrpSpPr>
+      <p:grpSpPr>
+        <a:xfrm>
+          <a:off x="0" y="0"/>
+          <a:ext cx="0" cy="0"/>
+          <a:chOff x="0" y="0"/>
+          <a:chExt cx="0" cy="0"/>
+        </a:xfrm>
+      </p:grpSpPr>
+      <p:sp>
+        <p:nvSpPr>
+          <p:cNvPr id="2" name="Título 1"/>
+          <p:cNvSpPr>
+            <a:spLocks noGrp="1"/>
+          </p:cNvSpPr>
+          <p:nvPr>
+            <p:ph type="title"/>
+          </p:nvPr>
+        </p:nvSpPr>
+        <p:spPr/>
+        <p:txBody>
+          <a:bodyPr/>
+          <a:lstStyle/>
+          <a:p>
+            <a:pPr algn="ctr"/>
+            <a:r>
+              <a:rPr lang="es-ES" dirty="0">
+                <a:solidFill>
+                  <a:srgbClr val="00B0F0"/>
+                </a:solidFill>
+              </a:rPr>
+              <a:t>Creador de Noticias</a:t>
+            </a:r>
+          </a:p>
+        </p:txBody>
+      </p:sp>
+      <p:pic>
+        <p:nvPicPr>
+          <p:cNvPr id="4" name="Marcador de contenido 3"/>
+          <p:cNvPicPr>
+            <a:picLocks noGrp="1" noChangeAspect="1"/>
+          </p:cNvPicPr>
+          <p:nvPr>
+            <p:ph idx="1"/>
+          </p:nvPr>
+        </p:nvPicPr>
+        <p:blipFill>
+          <a:blip r:embed="rId2">
+            <a:extLst>
+              <a:ext uri="{28A0092B-C50C-407E-A947-70E740481C1C}">
+                <a14:useLocalDpi xmlns:a14="http://schemas.microsoft.com/office/drawing/2010/main" val="0"/>
+              </a:ext>
+            </a:extLst>
+          </a:blip>
+          <a:stretch>
+            <a:fillRect/>
+          </a:stretch>
+        </p:blipFill>
+        <p:spPr>
+          <a:xfrm>
+            <a:off x="1406780" y="2308370"/>
+            <a:ext cx="2500202" cy="3881437"/>
+          </a:xfrm>
+        </p:spPr>
+      </p:pic>
+      <p:sp>
+        <p:nvSpPr>
+          <p:cNvPr id="5" name="CuadroTexto 4"/>
+          <p:cNvSpPr txBox="1"/>
+          <p:nvPr/>
+        </p:nvSpPr>
+        <p:spPr>
+          <a:xfrm>
+            <a:off x="4849091" y="3325758"/>
+            <a:ext cx="3389745" cy="1815882"/>
+          </a:xfrm>
+          <a:prstGeom prst="rect">
+            <a:avLst/>
+          </a:prstGeom>
+          <a:noFill/>
+        </p:spPr>
+        <p:txBody>
+          <a:bodyPr wrap="square" rtlCol="0">
+            <a:spAutoFit/>
+          </a:bodyPr>
+          <a:lstStyle/>
+          <a:p>
+            <a:r>
+              <a:rPr lang="es-ES" sz="2800" dirty="0"/>
+              <a:t>Aquí podemos ver como crearon las noticias de nuestra pagina</a:t>
+            </a:r>
+          </a:p>
+        </p:txBody>
+      </p:sp>
+    </p:spTree>
+    <p:extLst>
+      <p:ext uri="{BB962C8B-B14F-4D97-AF65-F5344CB8AC3E}">
+        <p14:creationId xmlns:p14="http://schemas.microsoft.com/office/powerpoint/2010/main" val="4210717906"/>
       </p:ext>
     </p:extLst>
   </p:cSld>

</xml_diff>

<commit_message>
imágenes más grandes powerpoint
</commit_message>
<xml_diff>
--- a/carles/poryecto integrado.pptx
+++ b/carles/poryecto integrado.pptx
@@ -6249,45 +6249,45 @@
         </p:nvSpPr>
         <p:spPr>
           <a:xfrm>
-            <a:off x="6289963" y="5022145"/>
+            <a:off x="6428508" y="4865127"/>
             <a:ext cx="2650838" cy="1835855"/>
           </a:xfrm>
         </p:spPr>
         <p:txBody>
           <a:bodyPr>
-            <a:normAutofit fontScale="92500" lnSpcReduction="10000"/>
+            <a:normAutofit fontScale="92500" lnSpcReduction="20000"/>
           </a:bodyPr>
           <a:lstStyle/>
           <a:p>
             <a:r>
-              <a:rPr lang="es-ES" dirty="0" smtClean="0"/>
+              <a:rPr lang="es-ES" sz="2200" dirty="0" smtClean="0"/>
               <a:t>Candela</a:t>
             </a:r>
           </a:p>
           <a:p>
             <a:r>
-              <a:rPr lang="es-ES" dirty="0" smtClean="0"/>
+              <a:rPr lang="es-ES" sz="2200" dirty="0" smtClean="0"/>
               <a:t>Paula</a:t>
             </a:r>
           </a:p>
           <a:p>
             <a:r>
-              <a:rPr lang="es-ES" dirty="0" smtClean="0"/>
+              <a:rPr lang="es-ES" sz="2200" dirty="0" smtClean="0"/>
               <a:t>Tino</a:t>
             </a:r>
           </a:p>
           <a:p>
             <a:r>
-              <a:rPr lang="es-ES" dirty="0" smtClean="0"/>
+              <a:rPr lang="es-ES" sz="2200" dirty="0" smtClean="0"/>
               <a:t>Alejandro</a:t>
             </a:r>
           </a:p>
           <a:p>
             <a:r>
-              <a:rPr lang="es-ES" dirty="0"/>
+              <a:rPr lang="es-ES" sz="2200" dirty="0"/>
               <a:t>Carles</a:t>
             </a:r>
-            <a:endParaRPr lang="es-ES" dirty="0" smtClean="0"/>
+            <a:endParaRPr lang="es-ES" sz="2200" dirty="0" smtClean="0"/>
           </a:p>
           <a:p>
             <a:endParaRPr lang="es-ES" dirty="0" smtClean="0"/>
@@ -6505,8 +6505,8 @@
         </p:blipFill>
         <p:spPr>
           <a:xfrm>
-            <a:off x="1762563" y="2373024"/>
-            <a:ext cx="1793437" cy="3881437"/>
+            <a:off x="885108" y="1930400"/>
+            <a:ext cx="2164060" cy="4683557"/>
           </a:xfrm>
         </p:spPr>
       </p:pic>
@@ -6785,8 +6785,8 @@
         </p:blipFill>
         <p:spPr>
           <a:xfrm>
-            <a:off x="1073088" y="2844079"/>
-            <a:ext cx="7805160" cy="3881437"/>
+            <a:off x="1073088" y="2632365"/>
+            <a:ext cx="7805160" cy="4093152"/>
           </a:xfrm>
           <a:prstGeom prst="rect">
             <a:avLst/>
@@ -6916,8 +6916,8 @@
         </p:blipFill>
         <p:spPr>
           <a:xfrm>
-            <a:off x="889677" y="2312266"/>
-            <a:ext cx="2398468" cy="4342534"/>
+            <a:off x="381677" y="1383273"/>
+            <a:ext cx="2906468" cy="5262291"/>
           </a:xfrm>
         </p:spPr>
       </p:pic>
@@ -7039,8 +7039,8 @@
         </p:blipFill>
         <p:spPr>
           <a:xfrm>
-            <a:off x="1844076" y="2160588"/>
-            <a:ext cx="6263885" cy="3870757"/>
+            <a:off x="1409967" y="1744952"/>
+            <a:ext cx="6996280" cy="4323339"/>
           </a:xfrm>
         </p:spPr>
       </p:pic>
@@ -7127,8 +7127,8 @@
         </p:blipFill>
         <p:spPr>
           <a:xfrm>
-            <a:off x="1624177" y="2400733"/>
-            <a:ext cx="1863827" cy="3881437"/>
+            <a:off x="677334" y="1412443"/>
+            <a:ext cx="2555393" cy="5321630"/>
           </a:xfrm>
         </p:spPr>
       </p:pic>
@@ -7344,8 +7344,8 @@
         </p:blipFill>
         <p:spPr>
           <a:xfrm>
-            <a:off x="882193" y="2493097"/>
-            <a:ext cx="2165808" cy="3881437"/>
+            <a:off x="677334" y="1754188"/>
+            <a:ext cx="2546158" cy="4729739"/>
           </a:xfrm>
         </p:spPr>
       </p:pic>
@@ -7552,8 +7552,8 @@
         </p:blipFill>
         <p:spPr>
           <a:xfrm>
-            <a:off x="1406780" y="2308370"/>
-            <a:ext cx="2075329" cy="3881437"/>
+            <a:off x="861835" y="1930400"/>
+            <a:ext cx="2449498" cy="4581236"/>
           </a:xfrm>
         </p:spPr>
       </p:pic>

</xml_diff>

<commit_message>
Remake powerpoint + capturas añadidas
</commit_message>
<xml_diff>
--- a/carles/poryecto integrado.pptx
+++ b/carles/poryecto integrado.pptx
@@ -5,22 +5,24 @@
     <p:sldMasterId id="2147483748" r:id="rId1"/>
   </p:sldMasterIdLst>
   <p:notesMasterIdLst>
-    <p:notesMasterId r:id="rId15"/>
+    <p:notesMasterId r:id="rId17"/>
   </p:notesMasterIdLst>
   <p:sldIdLst>
     <p:sldId id="256" r:id="rId2"/>
-    <p:sldId id="257" r:id="rId3"/>
-    <p:sldId id="262" r:id="rId4"/>
-    <p:sldId id="264" r:id="rId5"/>
-    <p:sldId id="258" r:id="rId6"/>
-    <p:sldId id="265" r:id="rId7"/>
-    <p:sldId id="259" r:id="rId8"/>
-    <p:sldId id="266" r:id="rId9"/>
-    <p:sldId id="260" r:id="rId10"/>
-    <p:sldId id="267" r:id="rId11"/>
-    <p:sldId id="261" r:id="rId12"/>
-    <p:sldId id="263" r:id="rId13"/>
-    <p:sldId id="268" r:id="rId14"/>
+    <p:sldId id="262" r:id="rId3"/>
+    <p:sldId id="264" r:id="rId4"/>
+    <p:sldId id="258" r:id="rId5"/>
+    <p:sldId id="265" r:id="rId6"/>
+    <p:sldId id="269" r:id="rId7"/>
+    <p:sldId id="270" r:id="rId8"/>
+    <p:sldId id="271" r:id="rId9"/>
+    <p:sldId id="259" r:id="rId10"/>
+    <p:sldId id="266" r:id="rId11"/>
+    <p:sldId id="260" r:id="rId12"/>
+    <p:sldId id="267" r:id="rId13"/>
+    <p:sldId id="261" r:id="rId14"/>
+    <p:sldId id="263" r:id="rId15"/>
+    <p:sldId id="268" r:id="rId16"/>
   </p:sldIdLst>
   <p:sldSz cx="12192000" cy="6858000"/>
   <p:notesSz cx="6858000" cy="9144000"/>
@@ -273,38 +275,37 @@
           <a:p>
             <a:pPr lvl="0"/>
             <a:r>
-              <a:rPr lang="es-ES" smtClean="0"/>
+              <a:rPr lang="es-ES"/>
               <a:t>Editar el estilo de texto del patrón</a:t>
             </a:r>
           </a:p>
           <a:p>
             <a:pPr lvl="1"/>
             <a:r>
-              <a:rPr lang="es-ES" smtClean="0"/>
+              <a:rPr lang="es-ES"/>
               <a:t>Segundo nivel</a:t>
             </a:r>
           </a:p>
           <a:p>
             <a:pPr lvl="2"/>
             <a:r>
-              <a:rPr lang="es-ES" smtClean="0"/>
+              <a:rPr lang="es-ES"/>
               <a:t>Tercer nivel</a:t>
             </a:r>
           </a:p>
           <a:p>
             <a:pPr lvl="3"/>
             <a:r>
-              <a:rPr lang="es-ES" smtClean="0"/>
+              <a:rPr lang="es-ES"/>
               <a:t>Cuarto nivel</a:t>
             </a:r>
           </a:p>
           <a:p>
             <a:pPr lvl="4"/>
             <a:r>
-              <a:rPr lang="es-ES" smtClean="0"/>
+              <a:rPr lang="es-ES"/>
               <a:t>Quinto nivel</a:t>
             </a:r>
-            <a:endParaRPr lang="es-ES"/>
           </a:p>
         </p:txBody>
       </p:sp>
@@ -1055,7 +1056,7 @@
           </a:lstStyle>
           <a:p>
             <a:r>
-              <a:rPr lang="es-ES" smtClean="0"/>
+              <a:rPr lang="es-ES"/>
               <a:t>Haga clic para modificar el estilo de título del patrón</a:t>
             </a:r>
             <a:endParaRPr lang="en-US" dirty="0"/>
@@ -1175,7 +1176,7 @@
           </a:lstStyle>
           <a:p>
             <a:r>
-              <a:rPr lang="es-ES" smtClean="0"/>
+              <a:rPr lang="es-ES"/>
               <a:t>Haga clic para editar el estilo de subtítulo del patrón</a:t>
             </a:r>
             <a:endParaRPr lang="en-US" dirty="0"/>
@@ -1304,7 +1305,7 @@
           </a:lstStyle>
           <a:p>
             <a:r>
-              <a:rPr lang="es-ES" smtClean="0"/>
+              <a:rPr lang="es-ES"/>
               <a:t>Haga clic para modificar el estilo de título del patrón</a:t>
             </a:r>
             <a:endParaRPr lang="en-US" dirty="0"/>
@@ -1427,7 +1428,7 @@
           <a:p>
             <a:pPr lvl="0"/>
             <a:r>
-              <a:rPr lang="es-ES" smtClean="0"/>
+              <a:rPr lang="es-ES"/>
               <a:t>Editar el estilo de texto del patrón</a:t>
             </a:r>
           </a:p>
@@ -1555,7 +1556,7 @@
           </a:lstStyle>
           <a:p>
             <a:r>
-              <a:rPr lang="es-ES" smtClean="0"/>
+              <a:rPr lang="es-ES"/>
               <a:t>Haga clic para modificar el estilo de título del patrón</a:t>
             </a:r>
             <a:endParaRPr lang="en-US" dirty="0"/>
@@ -1619,7 +1620,7 @@
           <a:p>
             <a:pPr lvl="0"/>
             <a:r>
-              <a:rPr lang="es-ES" smtClean="0"/>
+              <a:rPr lang="es-ES"/>
               <a:t>Editar el estilo de texto del patrón</a:t>
             </a:r>
           </a:p>
@@ -1741,7 +1742,7 @@
           <a:p>
             <a:pPr lvl="0"/>
             <a:r>
-              <a:rPr lang="es-ES" smtClean="0"/>
+              <a:rPr lang="es-ES"/>
               <a:t>Editar el estilo de texto del patrón</a:t>
             </a:r>
           </a:p>
@@ -1959,7 +1960,7 @@
           </a:lstStyle>
           <a:p>
             <a:r>
-              <a:rPr lang="es-ES" smtClean="0"/>
+              <a:rPr lang="es-ES"/>
               <a:t>Haga clic para modificar el estilo de título del patrón</a:t>
             </a:r>
             <a:endParaRPr lang="en-US" dirty="0"/>
@@ -2082,7 +2083,7 @@
           <a:p>
             <a:pPr lvl="0"/>
             <a:r>
-              <a:rPr lang="es-ES" smtClean="0"/>
+              <a:rPr lang="es-ES"/>
               <a:t>Editar el estilo de texto del patrón</a:t>
             </a:r>
           </a:p>
@@ -2210,7 +2211,7 @@
           </a:lstStyle>
           <a:p>
             <a:r>
-              <a:rPr lang="es-ES" smtClean="0"/>
+              <a:rPr lang="es-ES"/>
               <a:t>Haga clic para modificar el estilo de título del patrón</a:t>
             </a:r>
             <a:endParaRPr lang="en-US" dirty="0"/>
@@ -2274,7 +2275,7 @@
           <a:p>
             <a:pPr lvl="0"/>
             <a:r>
-              <a:rPr lang="es-ES" smtClean="0"/>
+              <a:rPr lang="es-ES"/>
               <a:t>Editar el estilo de texto del patrón</a:t>
             </a:r>
           </a:p>
@@ -2396,7 +2397,7 @@
           <a:p>
             <a:pPr lvl="0"/>
             <a:r>
-              <a:rPr lang="es-ES" smtClean="0"/>
+              <a:rPr lang="es-ES"/>
               <a:t>Editar el estilo de texto del patrón</a:t>
             </a:r>
           </a:p>
@@ -2606,7 +2607,7 @@
           </a:lstStyle>
           <a:p>
             <a:r>
-              <a:rPr lang="es-ES" smtClean="0"/>
+              <a:rPr lang="es-ES"/>
               <a:t>Haga clic para modificar el estilo de título del patrón</a:t>
             </a:r>
             <a:endParaRPr lang="en-US" dirty="0"/>
@@ -2667,7 +2668,7 @@
           <a:p>
             <a:pPr lvl="0"/>
             <a:r>
-              <a:rPr lang="es-ES" smtClean="0"/>
+              <a:rPr lang="es-ES"/>
               <a:t>Editar el estilo de texto del patrón</a:t>
             </a:r>
           </a:p>
@@ -2789,7 +2790,7 @@
           <a:p>
             <a:pPr lvl="0"/>
             <a:r>
-              <a:rPr lang="es-ES" smtClean="0"/>
+              <a:rPr lang="es-ES"/>
               <a:t>Editar el estilo de texto del patrón</a:t>
             </a:r>
           </a:p>
@@ -2906,7 +2907,7 @@
           <a:lstStyle/>
           <a:p>
             <a:r>
-              <a:rPr lang="es-ES" smtClean="0"/>
+              <a:rPr lang="es-ES"/>
               <a:t>Haga clic para modificar el estilo de título del patrón</a:t>
             </a:r>
             <a:endParaRPr lang="en-US" dirty="0"/>
@@ -2930,35 +2931,35 @@
           <a:p>
             <a:pPr lvl="0"/>
             <a:r>
-              <a:rPr lang="es-ES" smtClean="0"/>
+              <a:rPr lang="es-ES"/>
               <a:t>Editar el estilo de texto del patrón</a:t>
             </a:r>
           </a:p>
           <a:p>
             <a:pPr lvl="1"/>
             <a:r>
-              <a:rPr lang="es-ES" smtClean="0"/>
+              <a:rPr lang="es-ES"/>
               <a:t>Segundo nivel</a:t>
             </a:r>
           </a:p>
           <a:p>
             <a:pPr lvl="2"/>
             <a:r>
-              <a:rPr lang="es-ES" smtClean="0"/>
+              <a:rPr lang="es-ES"/>
               <a:t>Tercer nivel</a:t>
             </a:r>
           </a:p>
           <a:p>
             <a:pPr lvl="3"/>
             <a:r>
-              <a:rPr lang="es-ES" smtClean="0"/>
+              <a:rPr lang="es-ES"/>
               <a:t>Cuarto nivel</a:t>
             </a:r>
           </a:p>
           <a:p>
             <a:pPr lvl="4"/>
             <a:r>
-              <a:rPr lang="es-ES" smtClean="0"/>
+              <a:rPr lang="es-ES"/>
               <a:t>Quinto nivel</a:t>
             </a:r>
             <a:endParaRPr lang="en-US" dirty="0"/>
@@ -3081,7 +3082,7 @@
           <a:lstStyle/>
           <a:p>
             <a:r>
-              <a:rPr lang="es-ES" smtClean="0"/>
+              <a:rPr lang="es-ES"/>
               <a:t>Haga clic para modificar el estilo de título del patrón</a:t>
             </a:r>
             <a:endParaRPr lang="en-US" dirty="0"/>
@@ -3110,35 +3111,35 @@
           <a:p>
             <a:pPr lvl="0"/>
             <a:r>
-              <a:rPr lang="es-ES" smtClean="0"/>
+              <a:rPr lang="es-ES"/>
               <a:t>Editar el estilo de texto del patrón</a:t>
             </a:r>
           </a:p>
           <a:p>
             <a:pPr lvl="1"/>
             <a:r>
-              <a:rPr lang="es-ES" smtClean="0"/>
+              <a:rPr lang="es-ES"/>
               <a:t>Segundo nivel</a:t>
             </a:r>
           </a:p>
           <a:p>
             <a:pPr lvl="2"/>
             <a:r>
-              <a:rPr lang="es-ES" smtClean="0"/>
+              <a:rPr lang="es-ES"/>
               <a:t>Tercer nivel</a:t>
             </a:r>
           </a:p>
           <a:p>
             <a:pPr lvl="3"/>
             <a:r>
-              <a:rPr lang="es-ES" smtClean="0"/>
+              <a:rPr lang="es-ES"/>
               <a:t>Cuarto nivel</a:t>
             </a:r>
           </a:p>
           <a:p>
             <a:pPr lvl="4"/>
             <a:r>
-              <a:rPr lang="es-ES" smtClean="0"/>
+              <a:rPr lang="es-ES"/>
               <a:t>Quinto nivel</a:t>
             </a:r>
             <a:endParaRPr lang="en-US" dirty="0"/>
@@ -3262,7 +3263,7 @@
           </a:lstStyle>
           <a:p>
             <a:r>
-              <a:rPr lang="es-ES" smtClean="0"/>
+              <a:rPr lang="es-ES"/>
               <a:t>Haga clic para modificar el estilo de título del patrón</a:t>
             </a:r>
             <a:endParaRPr lang="en-US" dirty="0"/>
@@ -3286,35 +3287,35 @@
           <a:p>
             <a:pPr lvl="0"/>
             <a:r>
-              <a:rPr lang="es-ES" smtClean="0"/>
+              <a:rPr lang="es-ES"/>
               <a:t>Editar el estilo de texto del patrón</a:t>
             </a:r>
           </a:p>
           <a:p>
             <a:pPr lvl="1"/>
             <a:r>
-              <a:rPr lang="es-ES" smtClean="0"/>
+              <a:rPr lang="es-ES"/>
               <a:t>Segundo nivel</a:t>
             </a:r>
           </a:p>
           <a:p>
             <a:pPr lvl="2"/>
             <a:r>
-              <a:rPr lang="es-ES" smtClean="0"/>
+              <a:rPr lang="es-ES"/>
               <a:t>Tercer nivel</a:t>
             </a:r>
           </a:p>
           <a:p>
             <a:pPr lvl="3"/>
             <a:r>
-              <a:rPr lang="es-ES" smtClean="0"/>
+              <a:rPr lang="es-ES"/>
               <a:t>Cuarto nivel</a:t>
             </a:r>
           </a:p>
           <a:p>
             <a:pPr lvl="4"/>
             <a:r>
-              <a:rPr lang="es-ES" smtClean="0"/>
+              <a:rPr lang="es-ES"/>
               <a:t>Quinto nivel</a:t>
             </a:r>
             <a:endParaRPr lang="en-US" dirty="0"/>
@@ -3441,7 +3442,7 @@
           </a:lstStyle>
           <a:p>
             <a:r>
-              <a:rPr lang="es-ES" smtClean="0"/>
+              <a:rPr lang="es-ES"/>
               <a:t>Haga clic para modificar el estilo de título del patrón</a:t>
             </a:r>
             <a:endParaRPr lang="en-US" dirty="0"/>
@@ -3562,7 +3563,7 @@
           <a:p>
             <a:pPr lvl="0"/>
             <a:r>
-              <a:rPr lang="es-ES" smtClean="0"/>
+              <a:rPr lang="es-ES"/>
               <a:t>Editar el estilo de texto del patrón</a:t>
             </a:r>
           </a:p>
@@ -3679,7 +3680,7 @@
           <a:lstStyle/>
           <a:p>
             <a:r>
-              <a:rPr lang="es-ES" smtClean="0"/>
+              <a:rPr lang="es-ES"/>
               <a:t>Haga clic para modificar el estilo de título del patrón</a:t>
             </a:r>
             <a:endParaRPr lang="en-US" dirty="0"/>
@@ -3708,35 +3709,35 @@
           <a:p>
             <a:pPr lvl="0"/>
             <a:r>
-              <a:rPr lang="es-ES" smtClean="0"/>
+              <a:rPr lang="es-ES"/>
               <a:t>Editar el estilo de texto del patrón</a:t>
             </a:r>
           </a:p>
           <a:p>
             <a:pPr lvl="1"/>
             <a:r>
-              <a:rPr lang="es-ES" smtClean="0"/>
+              <a:rPr lang="es-ES"/>
               <a:t>Segundo nivel</a:t>
             </a:r>
           </a:p>
           <a:p>
             <a:pPr lvl="2"/>
             <a:r>
-              <a:rPr lang="es-ES" smtClean="0"/>
+              <a:rPr lang="es-ES"/>
               <a:t>Tercer nivel</a:t>
             </a:r>
           </a:p>
           <a:p>
             <a:pPr lvl="3"/>
             <a:r>
-              <a:rPr lang="es-ES" smtClean="0"/>
+              <a:rPr lang="es-ES"/>
               <a:t>Cuarto nivel</a:t>
             </a:r>
           </a:p>
           <a:p>
             <a:pPr lvl="4"/>
             <a:r>
-              <a:rPr lang="es-ES" smtClean="0"/>
+              <a:rPr lang="es-ES"/>
               <a:t>Quinto nivel</a:t>
             </a:r>
             <a:endParaRPr lang="en-US" dirty="0"/>
@@ -3765,35 +3766,35 @@
           <a:p>
             <a:pPr lvl="0"/>
             <a:r>
-              <a:rPr lang="es-ES" smtClean="0"/>
+              <a:rPr lang="es-ES"/>
               <a:t>Editar el estilo de texto del patrón</a:t>
             </a:r>
           </a:p>
           <a:p>
             <a:pPr lvl="1"/>
             <a:r>
-              <a:rPr lang="es-ES" smtClean="0"/>
+              <a:rPr lang="es-ES"/>
               <a:t>Segundo nivel</a:t>
             </a:r>
           </a:p>
           <a:p>
             <a:pPr lvl="2"/>
             <a:r>
-              <a:rPr lang="es-ES" smtClean="0"/>
+              <a:rPr lang="es-ES"/>
               <a:t>Tercer nivel</a:t>
             </a:r>
           </a:p>
           <a:p>
             <a:pPr lvl="3"/>
             <a:r>
-              <a:rPr lang="es-ES" smtClean="0"/>
+              <a:rPr lang="es-ES"/>
               <a:t>Cuarto nivel</a:t>
             </a:r>
           </a:p>
           <a:p>
             <a:pPr lvl="4"/>
             <a:r>
-              <a:rPr lang="es-ES" smtClean="0"/>
+              <a:rPr lang="es-ES"/>
               <a:t>Quinto nivel</a:t>
             </a:r>
             <a:endParaRPr lang="en-US" dirty="0"/>
@@ -3915,7 +3916,7 @@
           </a:lstStyle>
           <a:p>
             <a:r>
-              <a:rPr lang="es-ES" smtClean="0"/>
+              <a:rPr lang="es-ES"/>
               <a:t>Haga clic para modificar el estilo de título del patrón</a:t>
             </a:r>
             <a:endParaRPr lang="en-US" dirty="0"/>
@@ -3983,7 +3984,7 @@
           <a:p>
             <a:pPr lvl="0"/>
             <a:r>
-              <a:rPr lang="es-ES" smtClean="0"/>
+              <a:rPr lang="es-ES"/>
               <a:t>Editar el estilo de texto del patrón</a:t>
             </a:r>
           </a:p>
@@ -4013,35 +4014,35 @@
           <a:p>
             <a:pPr lvl="0"/>
             <a:r>
-              <a:rPr lang="es-ES" smtClean="0"/>
+              <a:rPr lang="es-ES"/>
               <a:t>Editar el estilo de texto del patrón</a:t>
             </a:r>
           </a:p>
           <a:p>
             <a:pPr lvl="1"/>
             <a:r>
-              <a:rPr lang="es-ES" smtClean="0"/>
+              <a:rPr lang="es-ES"/>
               <a:t>Segundo nivel</a:t>
             </a:r>
           </a:p>
           <a:p>
             <a:pPr lvl="2"/>
             <a:r>
-              <a:rPr lang="es-ES" smtClean="0"/>
+              <a:rPr lang="es-ES"/>
               <a:t>Tercer nivel</a:t>
             </a:r>
           </a:p>
           <a:p>
             <a:pPr lvl="3"/>
             <a:r>
-              <a:rPr lang="es-ES" smtClean="0"/>
+              <a:rPr lang="es-ES"/>
               <a:t>Cuarto nivel</a:t>
             </a:r>
           </a:p>
           <a:p>
             <a:pPr lvl="4"/>
             <a:r>
-              <a:rPr lang="es-ES" smtClean="0"/>
+              <a:rPr lang="es-ES"/>
               <a:t>Quinto nivel</a:t>
             </a:r>
             <a:endParaRPr lang="en-US" dirty="0"/>
@@ -4109,7 +4110,7 @@
           <a:p>
             <a:pPr lvl="0"/>
             <a:r>
-              <a:rPr lang="es-ES" smtClean="0"/>
+              <a:rPr lang="es-ES"/>
               <a:t>Editar el estilo de texto del patrón</a:t>
             </a:r>
           </a:p>
@@ -4139,35 +4140,35 @@
           <a:p>
             <a:pPr lvl="0"/>
             <a:r>
-              <a:rPr lang="es-ES" smtClean="0"/>
+              <a:rPr lang="es-ES"/>
               <a:t>Editar el estilo de texto del patrón</a:t>
             </a:r>
           </a:p>
           <a:p>
             <a:pPr lvl="1"/>
             <a:r>
-              <a:rPr lang="es-ES" smtClean="0"/>
+              <a:rPr lang="es-ES"/>
               <a:t>Segundo nivel</a:t>
             </a:r>
           </a:p>
           <a:p>
             <a:pPr lvl="2"/>
             <a:r>
-              <a:rPr lang="es-ES" smtClean="0"/>
+              <a:rPr lang="es-ES"/>
               <a:t>Tercer nivel</a:t>
             </a:r>
           </a:p>
           <a:p>
             <a:pPr lvl="3"/>
             <a:r>
-              <a:rPr lang="es-ES" smtClean="0"/>
+              <a:rPr lang="es-ES"/>
               <a:t>Cuarto nivel</a:t>
             </a:r>
           </a:p>
           <a:p>
             <a:pPr lvl="4"/>
             <a:r>
-              <a:rPr lang="es-ES" smtClean="0"/>
+              <a:rPr lang="es-ES"/>
               <a:t>Quinto nivel</a:t>
             </a:r>
             <a:endParaRPr lang="en-US" dirty="0"/>
@@ -4290,7 +4291,7 @@
           <a:lstStyle/>
           <a:p>
             <a:r>
-              <a:rPr lang="es-ES" smtClean="0"/>
+              <a:rPr lang="es-ES"/>
               <a:t>Haga clic para modificar el estilo de título del patrón</a:t>
             </a:r>
             <a:endParaRPr lang="en-US" dirty="0"/>
@@ -4514,7 +4515,7 @@
           </a:lstStyle>
           <a:p>
             <a:r>
-              <a:rPr lang="es-ES" smtClean="0"/>
+              <a:rPr lang="es-ES"/>
               <a:t>Haga clic para modificar el estilo de título del patrón</a:t>
             </a:r>
             <a:endParaRPr lang="en-US" dirty="0"/>
@@ -4545,35 +4546,35 @@
           <a:p>
             <a:pPr lvl="0"/>
             <a:r>
-              <a:rPr lang="es-ES" smtClean="0"/>
+              <a:rPr lang="es-ES"/>
               <a:t>Editar el estilo de texto del patrón</a:t>
             </a:r>
           </a:p>
           <a:p>
             <a:pPr lvl="1"/>
             <a:r>
-              <a:rPr lang="es-ES" smtClean="0"/>
+              <a:rPr lang="es-ES"/>
               <a:t>Segundo nivel</a:t>
             </a:r>
           </a:p>
           <a:p>
             <a:pPr lvl="2"/>
             <a:r>
-              <a:rPr lang="es-ES" smtClean="0"/>
+              <a:rPr lang="es-ES"/>
               <a:t>Tercer nivel</a:t>
             </a:r>
           </a:p>
           <a:p>
             <a:pPr lvl="3"/>
             <a:r>
-              <a:rPr lang="es-ES" smtClean="0"/>
+              <a:rPr lang="es-ES"/>
               <a:t>Cuarto nivel</a:t>
             </a:r>
           </a:p>
           <a:p>
             <a:pPr lvl="4"/>
             <a:r>
-              <a:rPr lang="es-ES" smtClean="0"/>
+              <a:rPr lang="es-ES"/>
               <a:t>Quinto nivel</a:t>
             </a:r>
             <a:endParaRPr lang="en-US" dirty="0"/>
@@ -4641,7 +4642,7 @@
           <a:p>
             <a:pPr lvl="0"/>
             <a:r>
-              <a:rPr lang="es-ES" smtClean="0"/>
+              <a:rPr lang="es-ES"/>
               <a:t>Editar el estilo de texto del patrón</a:t>
             </a:r>
           </a:p>
@@ -4769,7 +4770,7 @@
           </a:lstStyle>
           <a:p>
             <a:r>
-              <a:rPr lang="es-ES" smtClean="0"/>
+              <a:rPr lang="es-ES"/>
               <a:t>Haga clic para modificar el estilo de título del patrón</a:t>
             </a:r>
             <a:endParaRPr lang="en-US" dirty="0"/>
@@ -4836,7 +4837,7 @@
           </a:lstStyle>
           <a:p>
             <a:r>
-              <a:rPr lang="es-ES" smtClean="0"/>
+              <a:rPr lang="es-ES"/>
               <a:t>Haga clic en el icono para agregar una imagen</a:t>
             </a:r>
             <a:endParaRPr lang="en-US" dirty="0"/>
@@ -4904,7 +4905,7 @@
           <a:p>
             <a:pPr lvl="0"/>
             <a:r>
-              <a:rPr lang="es-ES" smtClean="0"/>
+              <a:rPr lang="es-ES"/>
               <a:t>Editar el estilo de texto del patrón</a:t>
             </a:r>
           </a:p>
@@ -5566,7 +5567,7 @@
           <a:lstStyle/>
           <a:p>
             <a:r>
-              <a:rPr lang="es-ES" smtClean="0"/>
+              <a:rPr lang="es-ES"/>
               <a:t>Haga clic para modificar el estilo de título del patrón</a:t>
             </a:r>
             <a:endParaRPr lang="en-US" dirty="0"/>
@@ -5600,35 +5601,35 @@
           <a:p>
             <a:pPr lvl="0"/>
             <a:r>
-              <a:rPr lang="es-ES" smtClean="0"/>
+              <a:rPr lang="es-ES"/>
               <a:t>Editar el estilo de texto del patrón</a:t>
             </a:r>
           </a:p>
           <a:p>
             <a:pPr lvl="1"/>
             <a:r>
-              <a:rPr lang="es-ES" smtClean="0"/>
+              <a:rPr lang="es-ES"/>
               <a:t>Segundo nivel</a:t>
             </a:r>
           </a:p>
           <a:p>
             <a:pPr lvl="2"/>
             <a:r>
-              <a:rPr lang="es-ES" smtClean="0"/>
+              <a:rPr lang="es-ES"/>
               <a:t>Tercer nivel</a:t>
             </a:r>
           </a:p>
           <a:p>
             <a:pPr lvl="3"/>
             <a:r>
-              <a:rPr lang="es-ES" smtClean="0"/>
+              <a:rPr lang="es-ES"/>
               <a:t>Cuarto nivel</a:t>
             </a:r>
           </a:p>
           <a:p>
             <a:pPr lvl="4"/>
             <a:r>
-              <a:rPr lang="es-ES" smtClean="0"/>
+              <a:rPr lang="es-ES"/>
               <a:t>Quinto nivel</a:t>
             </a:r>
             <a:endParaRPr lang="en-US" dirty="0"/>
@@ -6216,7 +6217,7 @@
           <a:p>
             <a:pPr algn="ctr"/>
             <a:r>
-              <a:rPr lang="sq-AL" sz="9600" b="1" dirty="0" smtClean="0">
+              <a:rPr lang="sq-AL" sz="9600" b="1" dirty="0">
                 <a:solidFill>
                   <a:schemeClr val="tx1">
                     <a:lumMod val="85000"/>
@@ -6225,10 +6226,6 @@
                 </a:solidFill>
               </a:rPr>
               <a:t>Mockup</a:t>
-            </a:r>
-            <a:r>
-              <a:rPr lang="es-ES" b="1" dirty="0"/>
-              <a:t/>
             </a:r>
             <a:br>
               <a:rPr lang="es-ES" b="1" dirty="0"/>
@@ -6260,25 +6257,25 @@
           <a:lstStyle/>
           <a:p>
             <a:r>
-              <a:rPr lang="es-ES" sz="2200" dirty="0" smtClean="0"/>
+              <a:rPr lang="es-ES" sz="2200" dirty="0"/>
               <a:t>Candela</a:t>
             </a:r>
           </a:p>
           <a:p>
             <a:r>
-              <a:rPr lang="es-ES" sz="2200" dirty="0" smtClean="0"/>
+              <a:rPr lang="es-ES" sz="2200" dirty="0"/>
               <a:t>Paula</a:t>
             </a:r>
           </a:p>
           <a:p>
             <a:r>
-              <a:rPr lang="es-ES" sz="2200" dirty="0" smtClean="0"/>
+              <a:rPr lang="es-ES" sz="2200" dirty="0"/>
               <a:t>Tino</a:t>
             </a:r>
           </a:p>
           <a:p>
             <a:r>
-              <a:rPr lang="es-ES" sz="2200" dirty="0" smtClean="0"/>
+              <a:rPr lang="es-ES" sz="2200" dirty="0"/>
               <a:t>Alejandro</a:t>
             </a:r>
           </a:p>
@@ -6287,13 +6284,12 @@
               <a:rPr lang="es-ES" sz="2200" dirty="0"/>
               <a:t>Carles</a:t>
             </a:r>
-            <a:endParaRPr lang="es-ES" sz="2200" dirty="0" smtClean="0"/>
-          </a:p>
-          <a:p>
-            <a:endParaRPr lang="es-ES" dirty="0" smtClean="0"/>
-          </a:p>
-          <a:p>
-            <a:endParaRPr lang="es-ES" dirty="0" smtClean="0"/>
+          </a:p>
+          <a:p>
+            <a:endParaRPr lang="es-ES" dirty="0"/>
+          </a:p>
+          <a:p>
+            <a:endParaRPr lang="es-ES" dirty="0"/>
           </a:p>
           <a:p>
             <a:endParaRPr lang="es-ES" dirty="0"/>
@@ -6334,13 +6330,6 @@
   <p:clrMapOvr>
     <a:masterClrMapping/>
   </p:clrMapOvr>
-  <p:timing>
-    <p:tnLst>
-      <p:par>
-        <p:cTn id="1" dur="indefinite" restart="never" nodeType="tmRoot"/>
-      </p:par>
-    </p:tnLst>
-  </p:timing>
 </p:sld>
 </file>
 
@@ -6373,6 +6362,92 @@
         </p:nvSpPr>
         <p:spPr/>
         <p:txBody>
+          <a:bodyPr/>
+          <a:lstStyle/>
+          <a:p>
+            <a:pPr algn="ctr"/>
+            <a:r>
+              <a:rPr lang="es-ES" sz="6600" dirty="0">
+                <a:solidFill>
+                  <a:schemeClr val="tx1"/>
+                </a:solidFill>
+              </a:rPr>
+              <a:t>PC</a:t>
+            </a:r>
+          </a:p>
+        </p:txBody>
+      </p:sp>
+      <p:pic>
+        <p:nvPicPr>
+          <p:cNvPr id="4" name="Marcador de contenido 3"/>
+          <p:cNvPicPr>
+            <a:picLocks noGrp="1" noChangeAspect="1"/>
+          </p:cNvPicPr>
+          <p:nvPr>
+            <p:ph idx="1"/>
+          </p:nvPr>
+        </p:nvPicPr>
+        <p:blipFill>
+          <a:blip r:embed="rId2">
+            <a:extLst>
+              <a:ext uri="{28A0092B-C50C-407E-A947-70E740481C1C}">
+                <a14:useLocalDpi xmlns:a14="http://schemas.microsoft.com/office/drawing/2010/main" val="0"/>
+              </a:ext>
+            </a:extLst>
+          </a:blip>
+          <a:stretch>
+            <a:fillRect/>
+          </a:stretch>
+        </p:blipFill>
+        <p:spPr>
+          <a:xfrm>
+            <a:off x="1866459" y="2160588"/>
+            <a:ext cx="6219120" cy="3881437"/>
+          </a:xfrm>
+        </p:spPr>
+      </p:pic>
+    </p:spTree>
+    <p:extLst>
+      <p:ext uri="{BB962C8B-B14F-4D97-AF65-F5344CB8AC3E}">
+        <p14:creationId xmlns:p14="http://schemas.microsoft.com/office/powerpoint/2010/main" val="3068362208"/>
+      </p:ext>
+    </p:extLst>
+  </p:cSld>
+  <p:clrMapOvr>
+    <a:masterClrMapping/>
+  </p:clrMapOvr>
+</p:sld>
+</file>
+
+<file path=ppt/slides/slide11.xml><?xml version="1.0" encoding="utf-8"?>
+<p:sld xmlns:a="http://schemas.openxmlformats.org/drawingml/2006/main" xmlns:r="http://schemas.openxmlformats.org/officeDocument/2006/relationships" xmlns:p="http://schemas.openxmlformats.org/presentationml/2006/main">
+  <p:cSld>
+    <p:spTree>
+      <p:nvGrpSpPr>
+        <p:cNvPr id="1" name=""/>
+        <p:cNvGrpSpPr/>
+        <p:nvPr/>
+      </p:nvGrpSpPr>
+      <p:grpSpPr>
+        <a:xfrm>
+          <a:off x="0" y="0"/>
+          <a:ext cx="0" cy="0"/>
+          <a:chOff x="0" y="0"/>
+          <a:chExt cx="0" cy="0"/>
+        </a:xfrm>
+      </p:grpSpPr>
+      <p:sp>
+        <p:nvSpPr>
+          <p:cNvPr id="2" name="Título 1"/>
+          <p:cNvSpPr>
+            <a:spLocks noGrp="1"/>
+          </p:cNvSpPr>
+          <p:nvPr>
+            <p:ph type="title"/>
+          </p:nvPr>
+        </p:nvSpPr>
+        <p:spPr/>
+        <p:txBody>
           <a:bodyPr>
             <a:normAutofit/>
           </a:bodyPr>
@@ -6380,18 +6455,101 @@
           <a:p>
             <a:pPr algn="ctr"/>
             <a:r>
-              <a:rPr lang="es-ES" sz="7200" dirty="0" smtClean="0">
-                <a:solidFill>
-                  <a:srgbClr val="00B0F0"/>
+              <a:rPr lang="es-ES" sz="4000" dirty="0">
+                <a:solidFill>
+                  <a:schemeClr val="tx1"/>
+                </a:solidFill>
+              </a:rPr>
+              <a:t>Creador de Noticias</a:t>
+            </a:r>
+          </a:p>
+        </p:txBody>
+      </p:sp>
+      <p:pic>
+        <p:nvPicPr>
+          <p:cNvPr id="4" name="Marcador de contenido 3"/>
+          <p:cNvPicPr>
+            <a:picLocks noGrp="1" noChangeAspect="1"/>
+          </p:cNvPicPr>
+          <p:nvPr>
+            <p:ph idx="1"/>
+          </p:nvPr>
+        </p:nvPicPr>
+        <p:blipFill>
+          <a:blip r:embed="rId2">
+            <a:extLst>
+              <a:ext uri="{28A0092B-C50C-407E-A947-70E740481C1C}">
+                <a14:useLocalDpi xmlns:a14="http://schemas.microsoft.com/office/drawing/2010/main" val="0"/>
+              </a:ext>
+            </a:extLst>
+          </a:blip>
+          <a:stretch>
+            <a:fillRect/>
+          </a:stretch>
+        </p:blipFill>
+        <p:spPr>
+          <a:xfrm>
+            <a:off x="3690890" y="1394286"/>
+            <a:ext cx="2843020" cy="5317231"/>
+          </a:xfrm>
+        </p:spPr>
+      </p:pic>
+    </p:spTree>
+    <p:extLst>
+      <p:ext uri="{BB962C8B-B14F-4D97-AF65-F5344CB8AC3E}">
+        <p14:creationId xmlns:p14="http://schemas.microsoft.com/office/powerpoint/2010/main" val="4210717906"/>
+      </p:ext>
+    </p:extLst>
+  </p:cSld>
+  <p:clrMapOvr>
+    <a:masterClrMapping/>
+  </p:clrMapOvr>
+</p:sld>
+</file>
+
+<file path=ppt/slides/slide12.xml><?xml version="1.0" encoding="utf-8"?>
+<p:sld xmlns:a="http://schemas.openxmlformats.org/drawingml/2006/main" xmlns:r="http://schemas.openxmlformats.org/officeDocument/2006/relationships" xmlns:p="http://schemas.openxmlformats.org/presentationml/2006/main">
+  <p:cSld>
+    <p:spTree>
+      <p:nvGrpSpPr>
+        <p:cNvPr id="1" name=""/>
+        <p:cNvGrpSpPr/>
+        <p:nvPr/>
+      </p:nvGrpSpPr>
+      <p:grpSpPr>
+        <a:xfrm>
+          <a:off x="0" y="0"/>
+          <a:ext cx="0" cy="0"/>
+          <a:chOff x="0" y="0"/>
+          <a:chExt cx="0" cy="0"/>
+        </a:xfrm>
+      </p:grpSpPr>
+      <p:sp>
+        <p:nvSpPr>
+          <p:cNvPr id="2" name="Título 1"/>
+          <p:cNvSpPr>
+            <a:spLocks noGrp="1"/>
+          </p:cNvSpPr>
+          <p:nvPr>
+            <p:ph type="title"/>
+          </p:nvPr>
+        </p:nvSpPr>
+        <p:spPr/>
+        <p:txBody>
+          <a:bodyPr>
+            <a:normAutofit/>
+          </a:bodyPr>
+          <a:lstStyle/>
+          <a:p>
+            <a:pPr algn="ctr"/>
+            <a:r>
+              <a:rPr lang="es-ES" sz="7200" dirty="0">
+                <a:solidFill>
+                  <a:schemeClr val="tx1"/>
                 </a:solidFill>
               </a:rPr>
               <a:t>PC</a:t>
             </a:r>
-            <a:endParaRPr lang="es-ES" sz="7200" dirty="0">
-              <a:solidFill>
-                <a:srgbClr val="00B0F0"/>
-              </a:solidFill>
-            </a:endParaRPr>
           </a:p>
         </p:txBody>
       </p:sp>
@@ -6437,7 +6595,7 @@
 </p:sld>
 </file>
 
-<file path=ppt/slides/slide11.xml><?xml version="1.0" encoding="utf-8"?>
+<file path=ppt/slides/slide13.xml><?xml version="1.0" encoding="utf-8"?>
 <p:sld xmlns:a="http://schemas.openxmlformats.org/drawingml/2006/main" xmlns:r="http://schemas.openxmlformats.org/officeDocument/2006/relationships" xmlns:p="http://schemas.openxmlformats.org/presentationml/2006/main">
   <p:cSld>
     <p:spTree>
@@ -6473,7 +6631,7 @@
             <a:r>
               <a:rPr lang="es-ES" dirty="0">
                 <a:solidFill>
-                  <a:srgbClr val="7030A0"/>
+                  <a:schemeClr val="tx1"/>
                 </a:solidFill>
               </a:rPr>
               <a:t>Comunitario</a:t>
@@ -6505,41 +6663,11 @@
         </p:blipFill>
         <p:spPr>
           <a:xfrm>
-            <a:off x="885108" y="1930400"/>
-            <a:ext cx="2164060" cy="4683557"/>
+            <a:off x="3879542" y="1435723"/>
+            <a:ext cx="2355710" cy="5098335"/>
           </a:xfrm>
         </p:spPr>
       </p:pic>
-      <p:sp>
-        <p:nvSpPr>
-          <p:cNvPr id="5" name="CuadroTexto 4"/>
-          <p:cNvSpPr txBox="1"/>
-          <p:nvPr/>
-        </p:nvSpPr>
-        <p:spPr>
-          <a:xfrm>
-            <a:off x="4257964" y="3113229"/>
-            <a:ext cx="3999346" cy="1384995"/>
-          </a:xfrm>
-          <a:prstGeom prst="rect">
-            <a:avLst/>
-          </a:prstGeom>
-          <a:noFill/>
-        </p:spPr>
-        <p:txBody>
-          <a:bodyPr wrap="square" rtlCol="0">
-            <a:spAutoFit/>
-          </a:bodyPr>
-          <a:lstStyle/>
-          <a:p>
-            <a:r>
-              <a:rPr lang="es-ES" sz="2800" dirty="0" smtClean="0"/>
-              <a:t>Aquí podemos ver la noticias que ponen los usuarios</a:t>
-            </a:r>
-            <a:endParaRPr lang="es-ES" sz="2800" dirty="0"/>
-          </a:p>
-        </p:txBody>
-      </p:sp>
     </p:spTree>
     <p:extLst>
       <p:ext uri="{BB962C8B-B14F-4D97-AF65-F5344CB8AC3E}">
@@ -6553,7 +6681,7 @@
 </p:sld>
 </file>
 
-<file path=ppt/slides/slide12.xml><?xml version="1.0" encoding="utf-8"?>
+<file path=ppt/slides/slide14.xml><?xml version="1.0" encoding="utf-8"?>
 <p:sld xmlns:a="http://schemas.openxmlformats.org/drawingml/2006/main" xmlns:r="http://schemas.openxmlformats.org/officeDocument/2006/relationships" xmlns:p="http://schemas.openxmlformats.org/presentationml/2006/main">
   <p:cSld>
     <p:spTree>
@@ -6589,18 +6717,13 @@
           <a:p>
             <a:pPr algn="ctr"/>
             <a:r>
-              <a:rPr lang="es-ES" sz="6600" dirty="0" smtClean="0">
-                <a:solidFill>
-                  <a:srgbClr val="7030A0"/>
+              <a:rPr lang="es-ES" sz="6600" dirty="0">
+                <a:solidFill>
+                  <a:schemeClr val="tx1"/>
                 </a:solidFill>
               </a:rPr>
               <a:t>PC</a:t>
             </a:r>
-            <a:endParaRPr lang="es-ES" sz="6600" dirty="0">
-              <a:solidFill>
-                <a:srgbClr val="7030A0"/>
-              </a:solidFill>
-            </a:endParaRPr>
           </a:p>
         </p:txBody>
       </p:sp>
@@ -6646,7 +6769,7 @@
 </p:sld>
 </file>
 
-<file path=ppt/slides/slide13.xml><?xml version="1.0" encoding="utf-8"?>
+<file path=ppt/slides/slide15.xml><?xml version="1.0" encoding="utf-8"?>
 <p:sld xmlns:a="http://schemas.openxmlformats.org/drawingml/2006/main" xmlns:r="http://schemas.openxmlformats.org/officeDocument/2006/relationships" xmlns:p="http://schemas.openxmlformats.org/presentationml/2006/main">
   <p:cSld>
     <p:spTree>
@@ -6734,30 +6857,25 @@
         </p:nvSpPr>
         <p:spPr>
           <a:xfrm>
-            <a:off x="677334" y="609600"/>
-            <a:ext cx="8596668" cy="2022764"/>
+            <a:off x="317116" y="480291"/>
+            <a:ext cx="8596668" cy="1320800"/>
           </a:xfrm>
         </p:spPr>
         <p:txBody>
           <a:bodyPr>
-            <a:noAutofit/>
+            <a:normAutofit/>
           </a:bodyPr>
           <a:lstStyle/>
           <a:p>
             <a:pPr algn="ctr"/>
             <a:r>
-              <a:rPr lang="sq-AL" sz="8800" dirty="0" smtClean="0">
-                <a:solidFill>
-                  <a:srgbClr val="FF0000"/>
+              <a:rPr lang="es-ES" sz="6600" dirty="0">
+                <a:solidFill>
+                  <a:schemeClr val="tx1"/>
                 </a:solidFill>
               </a:rPr>
-              <a:t>Movil</a:t>
-            </a:r>
-            <a:endParaRPr lang="sq-AL" sz="8800" dirty="0">
-              <a:solidFill>
-                <a:srgbClr val="FF0000"/>
-              </a:solidFill>
-            </a:endParaRPr>
+              <a:t>Principal</a:t>
+            </a:r>
           </a:p>
         </p:txBody>
       </p:sp>
@@ -6785,48 +6903,15 @@
         </p:blipFill>
         <p:spPr>
           <a:xfrm>
-            <a:off x="1073088" y="2632365"/>
-            <a:ext cx="7805160" cy="4093152"/>
+            <a:off x="3162216" y="1516438"/>
+            <a:ext cx="2906468" cy="5262291"/>
           </a:xfrm>
-          <a:prstGeom prst="rect">
-            <a:avLst/>
-          </a:prstGeom>
-          <a:solidFill>
-            <a:srgbClr val="FFFFFF">
-              <a:shade val="85000"/>
-            </a:srgbClr>
-          </a:solidFill>
-          <a:ln w="88900" cap="sq">
-            <a:solidFill>
-              <a:srgbClr val="FFFFFF"/>
-            </a:solidFill>
-            <a:miter lim="800000"/>
-          </a:ln>
-          <a:effectLst>
-            <a:outerShdw blurRad="55000" dist="18000" dir="5400000" algn="tl" rotWithShape="0">
-              <a:srgbClr val="000000">
-                <a:alpha val="40000"/>
-              </a:srgbClr>
-            </a:outerShdw>
-          </a:effectLst>
-          <a:scene3d>
-            <a:camera prst="orthographicFront"/>
-            <a:lightRig rig="twoPt" dir="t">
-              <a:rot lat="0" lon="0" rev="7200000"/>
-            </a:lightRig>
-          </a:scene3d>
-          <a:sp3d>
-            <a:bevelT w="25400" h="19050"/>
-            <a:contourClr>
-              <a:srgbClr val="FFFFFF"/>
-            </a:contourClr>
-          </a:sp3d>
         </p:spPr>
       </p:pic>
     </p:spTree>
     <p:extLst>
       <p:ext uri="{BB962C8B-B14F-4D97-AF65-F5344CB8AC3E}">
-        <p14:creationId xmlns:p14="http://schemas.microsoft.com/office/powerpoint/2010/main" val="4268654206"/>
+        <p14:creationId xmlns:p14="http://schemas.microsoft.com/office/powerpoint/2010/main" val="3824733592"/>
       </p:ext>
     </p:extLst>
   </p:cSld>
@@ -6863,12 +6948,7 @@
             <p:ph type="title"/>
           </p:nvPr>
         </p:nvSpPr>
-        <p:spPr>
-          <a:xfrm>
-            <a:off x="317116" y="480291"/>
-            <a:ext cx="8596668" cy="1320800"/>
-          </a:xfrm>
-        </p:spPr>
+        <p:spPr/>
         <p:txBody>
           <a:bodyPr>
             <a:normAutofit/>
@@ -6877,141 +6957,13 @@
           <a:p>
             <a:pPr algn="ctr"/>
             <a:r>
-              <a:rPr lang="es-ES" sz="6600" dirty="0" smtClean="0">
-                <a:solidFill>
-                  <a:srgbClr val="FFC000"/>
-                </a:solidFill>
-              </a:rPr>
-              <a:t>Principal</a:t>
-            </a:r>
-            <a:endParaRPr lang="es-ES" sz="6600" dirty="0">
-              <a:solidFill>
-                <a:srgbClr val="FFC000"/>
-              </a:solidFill>
-            </a:endParaRPr>
-          </a:p>
-        </p:txBody>
-      </p:sp>
-      <p:pic>
-        <p:nvPicPr>
-          <p:cNvPr id="4" name="Marcador de contenido 3"/>
-          <p:cNvPicPr>
-            <a:picLocks noGrp="1" noChangeAspect="1"/>
-          </p:cNvPicPr>
-          <p:nvPr>
-            <p:ph idx="1"/>
-          </p:nvPr>
-        </p:nvPicPr>
-        <p:blipFill>
-          <a:blip r:embed="rId2">
-            <a:extLst>
-              <a:ext uri="{28A0092B-C50C-407E-A947-70E740481C1C}">
-                <a14:useLocalDpi xmlns:a14="http://schemas.microsoft.com/office/drawing/2010/main" val="0"/>
-              </a:ext>
-            </a:extLst>
-          </a:blip>
-          <a:stretch>
-            <a:fillRect/>
-          </a:stretch>
-        </p:blipFill>
-        <p:spPr>
-          <a:xfrm>
-            <a:off x="381677" y="1383273"/>
-            <a:ext cx="2906468" cy="5262291"/>
-          </a:xfrm>
-        </p:spPr>
-      </p:pic>
-      <p:sp>
-        <p:nvSpPr>
-          <p:cNvPr id="5" name="CuadroTexto 4"/>
-          <p:cNvSpPr txBox="1"/>
-          <p:nvPr/>
-        </p:nvSpPr>
-        <p:spPr>
-          <a:xfrm>
-            <a:off x="3288145" y="3279847"/>
-            <a:ext cx="5107708" cy="954107"/>
-          </a:xfrm>
-          <a:prstGeom prst="rect">
-            <a:avLst/>
-          </a:prstGeom>
-          <a:noFill/>
-        </p:spPr>
-        <p:txBody>
-          <a:bodyPr wrap="square" rtlCol="0">
-            <a:spAutoFit/>
-          </a:bodyPr>
-          <a:lstStyle/>
-          <a:p>
-            <a:pPr algn="ctr"/>
-            <a:r>
-              <a:rPr lang="es-ES" sz="2800" dirty="0"/>
-              <a:t>Esta seria la idea de pagina principal de nuestro proyecto</a:t>
-            </a:r>
-          </a:p>
-        </p:txBody>
-      </p:sp>
-    </p:spTree>
-    <p:extLst>
-      <p:ext uri="{BB962C8B-B14F-4D97-AF65-F5344CB8AC3E}">
-        <p14:creationId xmlns:p14="http://schemas.microsoft.com/office/powerpoint/2010/main" val="3824733592"/>
-      </p:ext>
-    </p:extLst>
-  </p:cSld>
-  <p:clrMapOvr>
-    <a:masterClrMapping/>
-  </p:clrMapOvr>
-</p:sld>
-</file>
-
-<file path=ppt/slides/slide4.xml><?xml version="1.0" encoding="utf-8"?>
-<p:sld xmlns:a="http://schemas.openxmlformats.org/drawingml/2006/main" xmlns:r="http://schemas.openxmlformats.org/officeDocument/2006/relationships" xmlns:p="http://schemas.openxmlformats.org/presentationml/2006/main">
-  <p:cSld>
-    <p:spTree>
-      <p:nvGrpSpPr>
-        <p:cNvPr id="1" name=""/>
-        <p:cNvGrpSpPr/>
-        <p:nvPr/>
-      </p:nvGrpSpPr>
-      <p:grpSpPr>
-        <a:xfrm>
-          <a:off x="0" y="0"/>
-          <a:ext cx="0" cy="0"/>
-          <a:chOff x="0" y="0"/>
-          <a:chExt cx="0" cy="0"/>
-        </a:xfrm>
-      </p:grpSpPr>
-      <p:sp>
-        <p:nvSpPr>
-          <p:cNvPr id="2" name="Título 1"/>
-          <p:cNvSpPr>
-            <a:spLocks noGrp="1"/>
-          </p:cNvSpPr>
-          <p:nvPr>
-            <p:ph type="title"/>
-          </p:nvPr>
-        </p:nvSpPr>
-        <p:spPr/>
-        <p:txBody>
-          <a:bodyPr>
-            <a:normAutofit/>
-          </a:bodyPr>
-          <a:lstStyle/>
-          <a:p>
-            <a:pPr algn="ctr"/>
-            <a:r>
-              <a:rPr lang="es-ES" sz="6600" dirty="0" smtClean="0">
-                <a:solidFill>
-                  <a:srgbClr val="FFC000"/>
+              <a:rPr lang="es-ES" sz="6600" dirty="0">
+                <a:solidFill>
+                  <a:schemeClr val="tx1"/>
                 </a:solidFill>
               </a:rPr>
               <a:t>PC</a:t>
             </a:r>
-            <a:endParaRPr lang="es-ES" sz="6600" dirty="0">
-              <a:solidFill>
-                <a:srgbClr val="FFC000"/>
-              </a:solidFill>
-            </a:endParaRPr>
           </a:p>
         </p:txBody>
       </p:sp>
@@ -7057,6 +7009,94 @@
 </p:sld>
 </file>
 
+<file path=ppt/slides/slide4.xml><?xml version="1.0" encoding="utf-8"?>
+<p:sld xmlns:a="http://schemas.openxmlformats.org/drawingml/2006/main" xmlns:r="http://schemas.openxmlformats.org/officeDocument/2006/relationships" xmlns:p="http://schemas.openxmlformats.org/presentationml/2006/main">
+  <p:cSld>
+    <p:spTree>
+      <p:nvGrpSpPr>
+        <p:cNvPr id="1" name=""/>
+        <p:cNvGrpSpPr/>
+        <p:nvPr/>
+      </p:nvGrpSpPr>
+      <p:grpSpPr>
+        <a:xfrm>
+          <a:off x="0" y="0"/>
+          <a:ext cx="0" cy="0"/>
+          <a:chOff x="0" y="0"/>
+          <a:chExt cx="0" cy="0"/>
+        </a:xfrm>
+      </p:grpSpPr>
+      <p:sp>
+        <p:nvSpPr>
+          <p:cNvPr id="2" name="Título 1"/>
+          <p:cNvSpPr>
+            <a:spLocks noGrp="1"/>
+          </p:cNvSpPr>
+          <p:nvPr>
+            <p:ph type="title"/>
+          </p:nvPr>
+        </p:nvSpPr>
+        <p:spPr/>
+        <p:txBody>
+          <a:bodyPr>
+            <a:normAutofit/>
+          </a:bodyPr>
+          <a:lstStyle/>
+          <a:p>
+            <a:pPr algn="ctr"/>
+            <a:r>
+              <a:rPr lang="es-ES" sz="6600" dirty="0">
+                <a:solidFill>
+                  <a:schemeClr val="tx1"/>
+                </a:solidFill>
+              </a:rPr>
+              <a:t>Menú</a:t>
+            </a:r>
+          </a:p>
+        </p:txBody>
+      </p:sp>
+      <p:pic>
+        <p:nvPicPr>
+          <p:cNvPr id="4" name="Marcador de contenido 3"/>
+          <p:cNvPicPr>
+            <a:picLocks noGrp="1" noChangeAspect="1"/>
+          </p:cNvPicPr>
+          <p:nvPr>
+            <p:ph idx="1"/>
+          </p:nvPr>
+        </p:nvPicPr>
+        <p:blipFill>
+          <a:blip r:embed="rId2">
+            <a:extLst>
+              <a:ext uri="{28A0092B-C50C-407E-A947-70E740481C1C}">
+                <a14:useLocalDpi xmlns:a14="http://schemas.microsoft.com/office/drawing/2010/main" val="0"/>
+              </a:ext>
+            </a:extLst>
+          </a:blip>
+          <a:stretch>
+            <a:fillRect/>
+          </a:stretch>
+        </p:blipFill>
+        <p:spPr>
+          <a:xfrm>
+            <a:off x="3697971" y="1556345"/>
+            <a:ext cx="2555393" cy="5321630"/>
+          </a:xfrm>
+        </p:spPr>
+      </p:pic>
+    </p:spTree>
+    <p:extLst>
+      <p:ext uri="{BB962C8B-B14F-4D97-AF65-F5344CB8AC3E}">
+        <p14:creationId xmlns:p14="http://schemas.microsoft.com/office/powerpoint/2010/main" val="3768827183"/>
+      </p:ext>
+    </p:extLst>
+  </p:cSld>
+  <p:clrMapOvr>
+    <a:masterClrMapping/>
+  </p:clrMapOvr>
+</p:sld>
+</file>
+
 <file path=ppt/slides/slide5.xml><?xml version="1.0" encoding="utf-8"?>
 <p:sld xmlns:a="http://schemas.openxmlformats.org/drawingml/2006/main" xmlns:r="http://schemas.openxmlformats.org/officeDocument/2006/relationships" xmlns:p="http://schemas.openxmlformats.org/presentationml/2006/main">
   <p:cSld>
@@ -7093,137 +7133,13 @@
           <a:p>
             <a:pPr algn="ctr"/>
             <a:r>
-              <a:rPr lang="es-ES" sz="6600" dirty="0">
-                <a:solidFill>
-                  <a:srgbClr val="FFC000"/>
-                </a:solidFill>
-              </a:rPr>
-              <a:t>Menú</a:t>
-            </a:r>
-          </a:p>
-        </p:txBody>
-      </p:sp>
-      <p:pic>
-        <p:nvPicPr>
-          <p:cNvPr id="4" name="Marcador de contenido 3"/>
-          <p:cNvPicPr>
-            <a:picLocks noGrp="1" noChangeAspect="1"/>
-          </p:cNvPicPr>
-          <p:nvPr>
-            <p:ph idx="1"/>
-          </p:nvPr>
-        </p:nvPicPr>
-        <p:blipFill>
-          <a:blip r:embed="rId2">
-            <a:extLst>
-              <a:ext uri="{28A0092B-C50C-407E-A947-70E740481C1C}">
-                <a14:useLocalDpi xmlns:a14="http://schemas.microsoft.com/office/drawing/2010/main" val="0"/>
-              </a:ext>
-            </a:extLst>
-          </a:blip>
-          <a:stretch>
-            <a:fillRect/>
-          </a:stretch>
-        </p:blipFill>
-        <p:spPr>
-          <a:xfrm>
-            <a:off x="677334" y="1412443"/>
-            <a:ext cx="2555393" cy="5321630"/>
-          </a:xfrm>
-        </p:spPr>
-      </p:pic>
-      <p:sp>
-        <p:nvSpPr>
-          <p:cNvPr id="5" name="CuadroTexto 4"/>
-          <p:cNvSpPr txBox="1"/>
-          <p:nvPr/>
-        </p:nvSpPr>
-        <p:spPr>
-          <a:xfrm>
-            <a:off x="3934691" y="3121892"/>
-            <a:ext cx="3315855" cy="1815882"/>
-          </a:xfrm>
-          <a:prstGeom prst="rect">
-            <a:avLst/>
-          </a:prstGeom>
-          <a:noFill/>
-        </p:spPr>
-        <p:txBody>
-          <a:bodyPr wrap="square" rtlCol="0">
-            <a:spAutoFit/>
-          </a:bodyPr>
-          <a:lstStyle/>
-          <a:p>
-            <a:pPr algn="ctr"/>
-            <a:r>
-              <a:rPr lang="es-ES" sz="2800" dirty="0" smtClean="0"/>
-              <a:t>Aquí vemos una principal idea de un menú de nuestra pagina</a:t>
-            </a:r>
-            <a:endParaRPr lang="es-ES" sz="2800" dirty="0"/>
-          </a:p>
-        </p:txBody>
-      </p:sp>
-    </p:spTree>
-    <p:extLst>
-      <p:ext uri="{BB962C8B-B14F-4D97-AF65-F5344CB8AC3E}">
-        <p14:creationId xmlns:p14="http://schemas.microsoft.com/office/powerpoint/2010/main" val="3768827183"/>
-      </p:ext>
-    </p:extLst>
-  </p:cSld>
-  <p:clrMapOvr>
-    <a:masterClrMapping/>
-  </p:clrMapOvr>
-</p:sld>
-</file>
-
-<file path=ppt/slides/slide6.xml><?xml version="1.0" encoding="utf-8"?>
-<p:sld xmlns:a="http://schemas.openxmlformats.org/drawingml/2006/main" xmlns:r="http://schemas.openxmlformats.org/officeDocument/2006/relationships" xmlns:p="http://schemas.openxmlformats.org/presentationml/2006/main">
-  <p:cSld>
-    <p:spTree>
-      <p:nvGrpSpPr>
-        <p:cNvPr id="1" name=""/>
-        <p:cNvGrpSpPr/>
-        <p:nvPr/>
-      </p:nvGrpSpPr>
-      <p:grpSpPr>
-        <a:xfrm>
-          <a:off x="0" y="0"/>
-          <a:ext cx="0" cy="0"/>
-          <a:chOff x="0" y="0"/>
-          <a:chExt cx="0" cy="0"/>
-        </a:xfrm>
-      </p:grpSpPr>
-      <p:sp>
-        <p:nvSpPr>
-          <p:cNvPr id="2" name="Título 1"/>
-          <p:cNvSpPr>
-            <a:spLocks noGrp="1"/>
-          </p:cNvSpPr>
-          <p:nvPr>
-            <p:ph type="title"/>
-          </p:nvPr>
-        </p:nvSpPr>
-        <p:spPr/>
-        <p:txBody>
-          <a:bodyPr>
-            <a:normAutofit/>
-          </a:bodyPr>
-          <a:lstStyle/>
-          <a:p>
-            <a:pPr algn="ctr"/>
-            <a:r>
-              <a:rPr lang="es-ES" sz="6000" dirty="0" smtClean="0">
-                <a:solidFill>
-                  <a:srgbClr val="FFC000"/>
+              <a:rPr lang="es-ES" sz="6000" dirty="0">
+                <a:solidFill>
+                  <a:schemeClr val="tx1"/>
                 </a:solidFill>
               </a:rPr>
               <a:t>PC</a:t>
             </a:r>
-            <a:endParaRPr lang="es-ES" sz="6000" dirty="0">
-              <a:solidFill>
-                <a:srgbClr val="FFC000"/>
-              </a:solidFill>
-            </a:endParaRPr>
           </a:p>
         </p:txBody>
       </p:sp>
@@ -7269,6 +7185,136 @@
 </p:sld>
 </file>
 
+<file path=ppt/slides/slide6.xml><?xml version="1.0" encoding="utf-8"?>
+<p:sld xmlns:a="http://schemas.openxmlformats.org/drawingml/2006/main" xmlns:r="http://schemas.openxmlformats.org/officeDocument/2006/relationships" xmlns:p="http://schemas.openxmlformats.org/presentationml/2006/main">
+  <p:cSld>
+    <p:spTree>
+      <p:nvGrpSpPr>
+        <p:cNvPr id="1" name=""/>
+        <p:cNvGrpSpPr/>
+        <p:nvPr/>
+      </p:nvGrpSpPr>
+      <p:grpSpPr>
+        <a:xfrm>
+          <a:off x="0" y="0"/>
+          <a:ext cx="0" cy="0"/>
+          <a:chOff x="0" y="0"/>
+          <a:chExt cx="0" cy="0"/>
+        </a:xfrm>
+      </p:grpSpPr>
+      <p:sp>
+        <p:nvSpPr>
+          <p:cNvPr id="2" name="Título 1"/>
+          <p:cNvSpPr>
+            <a:spLocks noGrp="1"/>
+          </p:cNvSpPr>
+          <p:nvPr>
+            <p:ph type="title"/>
+          </p:nvPr>
+        </p:nvSpPr>
+        <p:spPr/>
+        <p:txBody>
+          <a:bodyPr>
+            <a:normAutofit/>
+          </a:bodyPr>
+          <a:lstStyle/>
+          <a:p>
+            <a:pPr algn="ctr"/>
+            <a:r>
+              <a:rPr lang="es-ES" sz="6000" dirty="0">
+                <a:solidFill>
+                  <a:schemeClr val="tx1"/>
+                </a:solidFill>
+              </a:rPr>
+              <a:t>Formularios</a:t>
+            </a:r>
+          </a:p>
+        </p:txBody>
+      </p:sp>
+      <p:pic>
+        <p:nvPicPr>
+          <p:cNvPr id="7" name="Marcador de contenido 6">
+            <a:extLst>
+              <a:ext uri="{FF2B5EF4-FFF2-40B4-BE49-F238E27FC236}">
+                <a16:creationId xmlns:a16="http://schemas.microsoft.com/office/drawing/2014/main" id="{1F76AD59-ECF1-4A9C-86C0-7A7C5CC6E2DD}"/>
+              </a:ext>
+            </a:extLst>
+          </p:cNvPr>
+          <p:cNvPicPr>
+            <a:picLocks noGrp="1" noChangeAspect="1"/>
+          </p:cNvPicPr>
+          <p:nvPr>
+            <p:ph idx="1"/>
+          </p:nvPr>
+        </p:nvPicPr>
+        <p:blipFill>
+          <a:blip r:embed="rId2">
+            <a:extLst>
+              <a:ext uri="{28A0092B-C50C-407E-A947-70E740481C1C}">
+                <a14:useLocalDpi xmlns:a14="http://schemas.microsoft.com/office/drawing/2010/main" val="0"/>
+              </a:ext>
+            </a:extLst>
+          </a:blip>
+          <a:stretch>
+            <a:fillRect/>
+          </a:stretch>
+        </p:blipFill>
+        <p:spPr>
+          <a:xfrm>
+            <a:off x="2176986" y="1578532"/>
+            <a:ext cx="2501916" cy="5145735"/>
+          </a:xfrm>
+        </p:spPr>
+      </p:pic>
+      <p:pic>
+        <p:nvPicPr>
+          <p:cNvPr id="9" name="Imagen 8">
+            <a:extLst>
+              <a:ext uri="{FF2B5EF4-FFF2-40B4-BE49-F238E27FC236}">
+                <a16:creationId xmlns:a16="http://schemas.microsoft.com/office/drawing/2014/main" id="{D4DB2CA9-CA9A-4CA6-970A-5003822E0401}"/>
+              </a:ext>
+            </a:extLst>
+          </p:cNvPr>
+          <p:cNvPicPr>
+            <a:picLocks noChangeAspect="1"/>
+          </p:cNvPicPr>
+          <p:nvPr/>
+        </p:nvPicPr>
+        <p:blipFill>
+          <a:blip r:embed="rId3">
+            <a:extLst>
+              <a:ext uri="{28A0092B-C50C-407E-A947-70E740481C1C}">
+                <a14:useLocalDpi xmlns:a14="http://schemas.microsoft.com/office/drawing/2010/main" val="0"/>
+              </a:ext>
+            </a:extLst>
+          </a:blip>
+          <a:stretch>
+            <a:fillRect/>
+          </a:stretch>
+        </p:blipFill>
+        <p:spPr>
+          <a:xfrm>
+            <a:off x="5403883" y="1555773"/>
+            <a:ext cx="2449553" cy="5191254"/>
+          </a:xfrm>
+          <a:prstGeom prst="rect">
+            <a:avLst/>
+          </a:prstGeom>
+        </p:spPr>
+      </p:pic>
+    </p:spTree>
+    <p:extLst>
+      <p:ext uri="{BB962C8B-B14F-4D97-AF65-F5344CB8AC3E}">
+        <p14:creationId xmlns:p14="http://schemas.microsoft.com/office/powerpoint/2010/main" val="1719331866"/>
+      </p:ext>
+    </p:extLst>
+  </p:cSld>
+  <p:clrMapOvr>
+    <a:masterClrMapping/>
+  </p:clrMapOvr>
+</p:sld>
+</file>
+
 <file path=ppt/slides/slide7.xml><?xml version="1.0" encoding="utf-8"?>
 <p:sld xmlns:a="http://schemas.openxmlformats.org/drawingml/2006/main" xmlns:r="http://schemas.openxmlformats.org/officeDocument/2006/relationships" xmlns:p="http://schemas.openxmlformats.org/presentationml/2006/main">
   <p:cSld>
@@ -7305,24 +7351,25 @@
           <a:p>
             <a:pPr algn="ctr"/>
             <a:r>
-              <a:rPr lang="es-ES" sz="8000" dirty="0" smtClean="0">
-                <a:solidFill>
-                  <a:srgbClr val="FFC000"/>
+              <a:rPr lang="es-ES" sz="6000" dirty="0">
+                <a:solidFill>
+                  <a:schemeClr val="tx1"/>
                 </a:solidFill>
               </a:rPr>
-              <a:t>Noticia</a:t>
-            </a:r>
-            <a:endParaRPr lang="es-ES" sz="8000" dirty="0">
-              <a:solidFill>
-                <a:srgbClr val="FFC000"/>
-              </a:solidFill>
-            </a:endParaRPr>
+              <a:t>Formularios</a:t>
+            </a:r>
           </a:p>
         </p:txBody>
       </p:sp>
       <p:pic>
         <p:nvPicPr>
-          <p:cNvPr id="4" name="Marcador de contenido 3"/>
+          <p:cNvPr id="6" name="Marcador de contenido 5">
+            <a:extLst>
+              <a:ext uri="{FF2B5EF4-FFF2-40B4-BE49-F238E27FC236}">
+                <a16:creationId xmlns:a16="http://schemas.microsoft.com/office/drawing/2014/main" id="{E5A7F383-D23A-43D9-B456-7E7710AE7831}"/>
+              </a:ext>
+            </a:extLst>
+          </p:cNvPr>
           <p:cNvPicPr>
             <a:picLocks noGrp="1" noChangeAspect="1"/>
           </p:cNvPicPr>
@@ -7344,46 +7391,15 @@
         </p:blipFill>
         <p:spPr>
           <a:xfrm>
-            <a:off x="677334" y="1754188"/>
-            <a:ext cx="2546158" cy="4729739"/>
+            <a:off x="1229412" y="1488281"/>
+            <a:ext cx="7665291" cy="4760119"/>
           </a:xfrm>
         </p:spPr>
       </p:pic>
-      <p:sp>
-        <p:nvSpPr>
-          <p:cNvPr id="5" name="CuadroTexto 4"/>
-          <p:cNvSpPr txBox="1"/>
-          <p:nvPr/>
-        </p:nvSpPr>
-        <p:spPr>
-          <a:xfrm>
-            <a:off x="4156363" y="3352800"/>
-            <a:ext cx="3500582" cy="1815882"/>
-          </a:xfrm>
-          <a:prstGeom prst="rect">
-            <a:avLst/>
-          </a:prstGeom>
-          <a:noFill/>
-        </p:spPr>
-        <p:txBody>
-          <a:bodyPr wrap="square" rtlCol="0">
-            <a:spAutoFit/>
-          </a:bodyPr>
-          <a:lstStyle/>
-          <a:p>
-            <a:pPr algn="ctr"/>
-            <a:r>
-              <a:rPr lang="es-ES" sz="2800" dirty="0" smtClean="0"/>
-              <a:t>Aquí podemos ver como quedaría la parte de noticias de nuestra pagina</a:t>
-            </a:r>
-            <a:endParaRPr lang="es-ES" sz="2800" dirty="0"/>
-          </a:p>
-        </p:txBody>
-      </p:sp>
     </p:spTree>
     <p:extLst>
       <p:ext uri="{BB962C8B-B14F-4D97-AF65-F5344CB8AC3E}">
-        <p14:creationId xmlns:p14="http://schemas.microsoft.com/office/powerpoint/2010/main" val="2105769093"/>
+        <p14:creationId xmlns:p14="http://schemas.microsoft.com/office/powerpoint/2010/main" val="709144216"/>
       </p:ext>
     </p:extLst>
   </p:cSld>
@@ -7422,29 +7438,32 @@
         </p:nvSpPr>
         <p:spPr/>
         <p:txBody>
-          <a:bodyPr/>
+          <a:bodyPr>
+            <a:normAutofit/>
+          </a:bodyPr>
           <a:lstStyle/>
           <a:p>
             <a:pPr algn="ctr"/>
             <a:r>
-              <a:rPr lang="es-ES" sz="6600" dirty="0" smtClean="0">
-                <a:solidFill>
-                  <a:srgbClr val="FF0000"/>
+              <a:rPr lang="es-ES" sz="6000" dirty="0">
+                <a:solidFill>
+                  <a:schemeClr val="tx1"/>
                 </a:solidFill>
               </a:rPr>
-              <a:t>PC</a:t>
-            </a:r>
-            <a:endParaRPr lang="es-ES" sz="6600" dirty="0">
-              <a:solidFill>
-                <a:srgbClr val="FF0000"/>
-              </a:solidFill>
-            </a:endParaRPr>
+              <a:t>Formularios</a:t>
+            </a:r>
           </a:p>
         </p:txBody>
       </p:sp>
       <p:pic>
         <p:nvPicPr>
-          <p:cNvPr id="4" name="Marcador de contenido 3"/>
+          <p:cNvPr id="7" name="Marcador de contenido 6">
+            <a:extLst>
+              <a:ext uri="{FF2B5EF4-FFF2-40B4-BE49-F238E27FC236}">
+                <a16:creationId xmlns:a16="http://schemas.microsoft.com/office/drawing/2014/main" id="{A7E408AB-36A4-4CFB-8ADA-463DA30E9778}"/>
+              </a:ext>
+            </a:extLst>
+          </p:cNvPr>
           <p:cNvPicPr>
             <a:picLocks noGrp="1" noChangeAspect="1"/>
           </p:cNvPicPr>
@@ -7466,15 +7485,15 @@
         </p:blipFill>
         <p:spPr>
           <a:xfrm>
-            <a:off x="1866459" y="2160588"/>
-            <a:ext cx="6219120" cy="3881437"/>
+            <a:off x="1342049" y="1654561"/>
+            <a:ext cx="7043657" cy="4524297"/>
           </a:xfrm>
         </p:spPr>
       </p:pic>
     </p:spTree>
     <p:extLst>
       <p:ext uri="{BB962C8B-B14F-4D97-AF65-F5344CB8AC3E}">
-        <p14:creationId xmlns:p14="http://schemas.microsoft.com/office/powerpoint/2010/main" val="3068362208"/>
+        <p14:creationId xmlns:p14="http://schemas.microsoft.com/office/powerpoint/2010/main" val="626124894"/>
       </p:ext>
     </p:extLst>
   </p:cSld>
@@ -7513,17 +7532,19 @@
         </p:nvSpPr>
         <p:spPr/>
         <p:txBody>
-          <a:bodyPr/>
+          <a:bodyPr>
+            <a:normAutofit/>
+          </a:bodyPr>
           <a:lstStyle/>
           <a:p>
             <a:pPr algn="ctr"/>
             <a:r>
-              <a:rPr lang="es-ES" dirty="0">
-                <a:solidFill>
-                  <a:srgbClr val="00B0F0"/>
+              <a:rPr lang="es-ES" sz="8000" dirty="0">
+                <a:solidFill>
+                  <a:schemeClr val="tx1"/>
                 </a:solidFill>
               </a:rPr>
-              <a:t>Creador de Noticias</a:t>
+              <a:t>Noticia</a:t>
             </a:r>
           </a:p>
         </p:txBody>
@@ -7552,45 +7573,15 @@
         </p:blipFill>
         <p:spPr>
           <a:xfrm>
-            <a:off x="861835" y="1930400"/>
-            <a:ext cx="2449498" cy="4581236"/>
+            <a:off x="3702589" y="1930400"/>
+            <a:ext cx="2546158" cy="4729739"/>
           </a:xfrm>
         </p:spPr>
       </p:pic>
-      <p:sp>
-        <p:nvSpPr>
-          <p:cNvPr id="5" name="CuadroTexto 4"/>
-          <p:cNvSpPr txBox="1"/>
-          <p:nvPr/>
-        </p:nvSpPr>
-        <p:spPr>
-          <a:xfrm>
-            <a:off x="4849091" y="3325758"/>
-            <a:ext cx="3389745" cy="1815882"/>
-          </a:xfrm>
-          <a:prstGeom prst="rect">
-            <a:avLst/>
-          </a:prstGeom>
-          <a:noFill/>
-        </p:spPr>
-        <p:txBody>
-          <a:bodyPr wrap="square" rtlCol="0">
-            <a:spAutoFit/>
-          </a:bodyPr>
-          <a:lstStyle/>
-          <a:p>
-            <a:pPr algn="ctr"/>
-            <a:r>
-              <a:rPr lang="es-ES" sz="2800" dirty="0"/>
-              <a:t>Aquí podemos ver como crearon las noticias de nuestra pagina</a:t>
-            </a:r>
-          </a:p>
-        </p:txBody>
-      </p:sp>
     </p:spTree>
     <p:extLst>
       <p:ext uri="{BB962C8B-B14F-4D97-AF65-F5344CB8AC3E}">
-        <p14:creationId xmlns:p14="http://schemas.microsoft.com/office/powerpoint/2010/main" val="4210717906"/>
+        <p14:creationId xmlns:p14="http://schemas.microsoft.com/office/powerpoint/2010/main" val="2105769093"/>
       </p:ext>
     </p:extLst>
   </p:cSld>

</xml_diff>